<commit_message>
Gary's updates after 4/2's design discussions.
</commit_message>
<xml_diff>
--- a/Documentation/MarFS.pptx
+++ b/Documentation/MarFS.pptx
@@ -15,11 +15,12 @@
     <p:sldId id="257" r:id="rId9"/>
     <p:sldId id="258" r:id="rId10"/>
     <p:sldId id="259" r:id="rId11"/>
-    <p:sldId id="260" r:id="rId12"/>
-    <p:sldId id="261" r:id="rId13"/>
-    <p:sldId id="262" r:id="rId14"/>
-    <p:sldId id="263" r:id="rId15"/>
-    <p:sldId id="264" r:id="rId16"/>
+    <p:sldId id="271" r:id="rId12"/>
+    <p:sldId id="260" r:id="rId13"/>
+    <p:sldId id="261" r:id="rId14"/>
+    <p:sldId id="262" r:id="rId15"/>
+    <p:sldId id="263" r:id="rId16"/>
+    <p:sldId id="264" r:id="rId17"/>
   </p:sldIdLst>
   <p:sldSz cx="9144000" cy="6858000" type="screen4x3"/>
   <p:notesSz cx="6858000" cy="9144000"/>
@@ -302,7 +303,7 @@
           <a:p>
             <a:fld id="{E56B258B-56D6-9F4B-8030-AEA09AD708E7}" type="datetimeFigureOut">
               <a:rPr lang="en-US" smtClean="0"/>
-              <a:t>3/29/15</a:t>
+              <a:t>4/3/15</a:t>
             </a:fld>
             <a:endParaRPr lang="en-US"/>
           </a:p>
@@ -472,7 +473,7 @@
           <a:p>
             <a:fld id="{E56B258B-56D6-9F4B-8030-AEA09AD708E7}" type="datetimeFigureOut">
               <a:rPr lang="en-US" smtClean="0"/>
-              <a:t>3/29/15</a:t>
+              <a:t>4/3/15</a:t>
             </a:fld>
             <a:endParaRPr lang="en-US"/>
           </a:p>
@@ -652,7 +653,7 @@
           <a:p>
             <a:fld id="{E56B258B-56D6-9F4B-8030-AEA09AD708E7}" type="datetimeFigureOut">
               <a:rPr lang="en-US" smtClean="0"/>
-              <a:t>3/29/15</a:t>
+              <a:t>4/3/15</a:t>
             </a:fld>
             <a:endParaRPr lang="en-US"/>
           </a:p>
@@ -822,7 +823,7 @@
           <a:p>
             <a:fld id="{E56B258B-56D6-9F4B-8030-AEA09AD708E7}" type="datetimeFigureOut">
               <a:rPr lang="en-US" smtClean="0"/>
-              <a:t>3/29/15</a:t>
+              <a:t>4/3/15</a:t>
             </a:fld>
             <a:endParaRPr lang="en-US"/>
           </a:p>
@@ -1068,7 +1069,7 @@
           <a:p>
             <a:fld id="{E56B258B-56D6-9F4B-8030-AEA09AD708E7}" type="datetimeFigureOut">
               <a:rPr lang="en-US" smtClean="0"/>
-              <a:t>3/29/15</a:t>
+              <a:t>4/3/15</a:t>
             </a:fld>
             <a:endParaRPr lang="en-US"/>
           </a:p>
@@ -1356,7 +1357,7 @@
           <a:p>
             <a:fld id="{E56B258B-56D6-9F4B-8030-AEA09AD708E7}" type="datetimeFigureOut">
               <a:rPr lang="en-US" smtClean="0"/>
-              <a:t>3/29/15</a:t>
+              <a:t>4/3/15</a:t>
             </a:fld>
             <a:endParaRPr lang="en-US"/>
           </a:p>
@@ -1778,7 +1779,7 @@
           <a:p>
             <a:fld id="{E56B258B-56D6-9F4B-8030-AEA09AD708E7}" type="datetimeFigureOut">
               <a:rPr lang="en-US" smtClean="0"/>
-              <a:t>3/29/15</a:t>
+              <a:t>4/3/15</a:t>
             </a:fld>
             <a:endParaRPr lang="en-US"/>
           </a:p>
@@ -1896,7 +1897,7 @@
           <a:p>
             <a:fld id="{E56B258B-56D6-9F4B-8030-AEA09AD708E7}" type="datetimeFigureOut">
               <a:rPr lang="en-US" smtClean="0"/>
-              <a:t>3/29/15</a:t>
+              <a:t>4/3/15</a:t>
             </a:fld>
             <a:endParaRPr lang="en-US"/>
           </a:p>
@@ -1991,7 +1992,7 @@
           <a:p>
             <a:fld id="{E56B258B-56D6-9F4B-8030-AEA09AD708E7}" type="datetimeFigureOut">
               <a:rPr lang="en-US" smtClean="0"/>
-              <a:t>3/29/15</a:t>
+              <a:t>4/3/15</a:t>
             </a:fld>
             <a:endParaRPr lang="en-US"/>
           </a:p>
@@ -2268,7 +2269,7 @@
           <a:p>
             <a:fld id="{E56B258B-56D6-9F4B-8030-AEA09AD708E7}" type="datetimeFigureOut">
               <a:rPr lang="en-US" smtClean="0"/>
-              <a:t>3/29/15</a:t>
+              <a:t>4/3/15</a:t>
             </a:fld>
             <a:endParaRPr lang="en-US"/>
           </a:p>
@@ -2521,7 +2522,7 @@
           <a:p>
             <a:fld id="{E56B258B-56D6-9F4B-8030-AEA09AD708E7}" type="datetimeFigureOut">
               <a:rPr lang="en-US" smtClean="0"/>
-              <a:t>3/29/15</a:t>
+              <a:t>4/3/15</a:t>
             </a:fld>
             <a:endParaRPr lang="en-US"/>
           </a:p>
@@ -2734,7 +2735,7 @@
           <a:p>
             <a:fld id="{E56B258B-56D6-9F4B-8030-AEA09AD708E7}" type="datetimeFigureOut">
               <a:rPr lang="en-US" smtClean="0"/>
-              <a:t>3/29/15</a:t>
+              <a:t>4/3/15</a:t>
             </a:fld>
             <a:endParaRPr lang="en-US"/>
           </a:p>
@@ -3370,7 +3371,7 @@
         <p:spPr>
           <a:xfrm>
             <a:off x="457200" y="274638"/>
-            <a:ext cx="8229600" cy="423862"/>
+            <a:ext cx="8229600" cy="436562"/>
           </a:xfrm>
         </p:spPr>
         <p:txBody>
@@ -3381,7 +3382,7 @@
           <a:p>
             <a:r>
               <a:rPr lang="en-US" dirty="0" smtClean="0"/>
-              <a:t>Unknowns/needs</a:t>
+              <a:t>Recoverability</a:t>
             </a:r>
             <a:endParaRPr lang="en-US" dirty="0"/>
           </a:p>
@@ -3399,206 +3400,54 @@
         </p:nvSpPr>
         <p:spPr>
           <a:xfrm>
-            <a:off x="457200" y="968375"/>
-            <a:ext cx="8229600" cy="5746750"/>
-          </a:xfrm>
-        </p:spPr>
-        <p:txBody>
-          <a:bodyPr>
-            <a:normAutofit fontScale="62500" lnSpcReduction="20000"/>
-          </a:bodyPr>
-          <a:lstStyle/>
-          <a:p>
-            <a:r>
-              <a:rPr lang="en-US" dirty="0" smtClean="0"/>
-              <a:t>Does </a:t>
-            </a:r>
-            <a:r>
-              <a:rPr lang="en-US" dirty="0" err="1" smtClean="0"/>
-              <a:t>ilm</a:t>
-            </a:r>
-            <a:r>
-              <a:rPr lang="en-US" dirty="0" smtClean="0"/>
-              <a:t> support </a:t>
-            </a:r>
-            <a:r>
-              <a:rPr lang="en-US" dirty="0" err="1" smtClean="0"/>
-              <a:t>xattr</a:t>
-            </a:r>
-            <a:r>
-              <a:rPr lang="en-US" dirty="0" smtClean="0"/>
-              <a:t> queries, might effect if we use xattrs or just put all </a:t>
-            </a:r>
-            <a:r>
-              <a:rPr lang="en-US" dirty="0" err="1" smtClean="0"/>
-              <a:t>metameta</a:t>
-            </a:r>
-            <a:r>
-              <a:rPr lang="en-US" dirty="0" smtClean="0"/>
-              <a:t> data in the </a:t>
-            </a:r>
-            <a:r>
-              <a:rPr lang="en-US" dirty="0" err="1" smtClean="0"/>
-              <a:t>gpfs</a:t>
-            </a:r>
-            <a:r>
-              <a:rPr lang="en-US" dirty="0" smtClean="0"/>
-              <a:t> file   </a:t>
-            </a:r>
-            <a:r>
-              <a:rPr lang="en-US" dirty="0" smtClean="0">
-                <a:solidFill>
-                  <a:srgbClr val="FF0000"/>
-                </a:solidFill>
-              </a:rPr>
-              <a:t>yes but need to test performance</a:t>
-            </a:r>
-          </a:p>
-          <a:p>
-            <a:r>
-              <a:rPr lang="en-US" dirty="0" smtClean="0"/>
-              <a:t>Can we use </a:t>
-            </a:r>
-            <a:r>
-              <a:rPr lang="en-US" dirty="0" err="1" smtClean="0"/>
-              <a:t>gpfs</a:t>
-            </a:r>
-            <a:r>
-              <a:rPr lang="en-US" dirty="0" smtClean="0"/>
-              <a:t> quotas in any useful way or just roll our own lazy quota system (as designed in previous slides) </a:t>
-            </a:r>
-            <a:r>
-              <a:rPr lang="en-US" dirty="0" smtClean="0">
-                <a:solidFill>
-                  <a:srgbClr val="FF0000"/>
-                </a:solidFill>
-              </a:rPr>
-              <a:t>need our own, pretty easy though</a:t>
-            </a:r>
-          </a:p>
-          <a:p>
-            <a:r>
-              <a:rPr lang="en-US" dirty="0" smtClean="0"/>
-              <a:t>Make sure </a:t>
-            </a:r>
-            <a:r>
-              <a:rPr lang="en-US" dirty="0" err="1" smtClean="0"/>
-              <a:t>gpfs</a:t>
-            </a:r>
-            <a:r>
-              <a:rPr lang="en-US" dirty="0" smtClean="0"/>
-              <a:t> does sparse when you </a:t>
-            </a:r>
-            <a:r>
-              <a:rPr lang="en-US" dirty="0" err="1" smtClean="0"/>
-              <a:t>trunc</a:t>
-            </a:r>
-            <a:r>
-              <a:rPr lang="en-US" dirty="0" smtClean="0"/>
-              <a:t> a file to X size, makes it possible for us to use size field and not add an </a:t>
-            </a:r>
-            <a:r>
-              <a:rPr lang="en-US" dirty="0" err="1" smtClean="0"/>
-              <a:t>xattr</a:t>
-            </a:r>
-            <a:r>
-              <a:rPr lang="en-US" dirty="0" smtClean="0"/>
-              <a:t> for file size </a:t>
-            </a:r>
-            <a:r>
-              <a:rPr lang="en-US" dirty="0" smtClean="0">
-                <a:solidFill>
-                  <a:srgbClr val="FF0000"/>
-                </a:solidFill>
-              </a:rPr>
-              <a:t>ok</a:t>
-            </a:r>
-          </a:p>
-          <a:p>
-            <a:r>
-              <a:rPr lang="en-US" dirty="0" smtClean="0"/>
-              <a:t>Security model for object store, compatible with user security somehow found two potential ways</a:t>
-            </a:r>
-            <a:r>
-              <a:rPr lang="en-US" dirty="0" smtClean="0">
-                <a:solidFill>
-                  <a:srgbClr val="FF0000"/>
-                </a:solidFill>
-              </a:rPr>
-              <a:t>, master object user with secret is most likely</a:t>
-            </a:r>
-          </a:p>
-          <a:p>
-            <a:r>
-              <a:rPr lang="en-US" dirty="0" smtClean="0"/>
-              <a:t>Speed/size planning for </a:t>
-            </a:r>
-            <a:r>
-              <a:rPr lang="en-US" dirty="0" err="1" smtClean="0"/>
-              <a:t>gpfs</a:t>
-            </a:r>
-            <a:r>
-              <a:rPr lang="en-US" dirty="0" smtClean="0"/>
-              <a:t> metadata nodes/storage – could use the EMC flash array for testing</a:t>
-            </a:r>
-          </a:p>
-          <a:p>
-            <a:r>
-              <a:rPr lang="en-US" dirty="0" smtClean="0"/>
-              <a:t>Speed/size planning for object, push for V2 of erasure lib, using optimal object size, how much memory, how much BW do you get, can you enumerate object metadata for backup (not a show stopper)</a:t>
-            </a:r>
-          </a:p>
-          <a:p>
-            <a:r>
-              <a:rPr lang="en-US" dirty="0" smtClean="0"/>
-              <a:t>Make sure erasure object works works reasonably well with SMR</a:t>
-            </a:r>
-          </a:p>
-          <a:p>
-            <a:r>
-              <a:rPr lang="en-US" dirty="0" smtClean="0"/>
-              <a:t>Does fuse always provide a close so you can update size/date on close or do you have to poke size and date on all writes?  I think it gives you a close no matter what, not a show stopper, just need to know  </a:t>
-            </a:r>
-            <a:r>
-              <a:rPr lang="en-US" dirty="0" smtClean="0">
-                <a:solidFill>
-                  <a:srgbClr val="FF0000"/>
-                </a:solidFill>
-              </a:rPr>
-              <a:t>(yes it does)</a:t>
-            </a:r>
-          </a:p>
-          <a:p>
-            <a:r>
-              <a:rPr lang="en-US" dirty="0" smtClean="0"/>
-              <a:t>Determine how to hide the </a:t>
-            </a:r>
-            <a:r>
-              <a:rPr lang="en-US" dirty="0" err="1" smtClean="0"/>
-              <a:t>gpfs</a:t>
-            </a:r>
-            <a:r>
-              <a:rPr lang="en-US" dirty="0" smtClean="0"/>
-              <a:t> metadata only name space from general user shells, via </a:t>
-            </a:r>
-            <a:r>
-              <a:rPr lang="en-US" dirty="0" err="1" smtClean="0"/>
-              <a:t>unshare</a:t>
-            </a:r>
-            <a:r>
-              <a:rPr lang="en-US" dirty="0" smtClean="0"/>
-              <a:t>/mount bind or other clever mechanisms  </a:t>
-            </a:r>
-            <a:r>
-              <a:rPr lang="en-US" dirty="0" smtClean="0">
-                <a:solidFill>
-                  <a:srgbClr val="FF0000"/>
-                </a:solidFill>
-              </a:rPr>
-              <a:t>(looks like there are ways to do this)</a:t>
-            </a:r>
-          </a:p>
-          <a:p>
+            <a:off x="457200" y="876300"/>
+            <a:ext cx="8229600" cy="5249863"/>
+          </a:xfrm>
+        </p:spPr>
+        <p:txBody>
+          <a:bodyPr/>
+          <a:lstStyle/>
+          <a:p>
+            <a:r>
+              <a:rPr lang="en-US" dirty="0" smtClean="0"/>
+              <a:t>Backup of the </a:t>
+            </a:r>
+            <a:r>
+              <a:rPr lang="en-US" dirty="0" err="1" smtClean="0"/>
+              <a:t>mds</a:t>
+            </a:r>
+            <a:r>
+              <a:rPr lang="en-US" dirty="0" smtClean="0"/>
+              <a:t>(s) backs up the metadata</a:t>
+            </a:r>
+          </a:p>
+          <a:p>
+            <a:r>
+              <a:rPr lang="en-US" dirty="0" smtClean="0"/>
+              <a:t>Build in recoverability, objects are encoded with all we know about the file that is represented in that object at create time, to assist with recoverability.</a:t>
+            </a:r>
+          </a:p>
+          <a:p>
+            <a:r>
+              <a:rPr lang="en-US" dirty="0" smtClean="0"/>
+              <a:t>The create time file metadata encoded in the objects may be out of date if the </a:t>
+            </a:r>
+            <a:r>
+              <a:rPr lang="en-US" dirty="0" err="1" smtClean="0"/>
+              <a:t>mds</a:t>
+            </a:r>
+            <a:r>
+              <a:rPr lang="en-US" dirty="0" smtClean="0"/>
+              <a:t> metadata has been updated (rename, </a:t>
+            </a:r>
+            <a:r>
+              <a:rPr lang="en-US" dirty="0" err="1" smtClean="0"/>
+              <a:t>chmod</a:t>
+            </a:r>
+            <a:r>
+              <a:rPr lang="en-US" dirty="0" smtClean="0"/>
+              <a:t>, etc.)</a:t>
+            </a:r>
             <a:endParaRPr lang="en-US" dirty="0"/>
           </a:p>
         </p:txBody>
@@ -3606,7 +3455,7 @@
     </p:spTree>
     <p:extLst>
       <p:ext uri="{BB962C8B-B14F-4D97-AF65-F5344CB8AC3E}">
-        <p14:creationId xmlns:p14="http://schemas.microsoft.com/office/powerpoint/2010/main" val="2262753033"/>
+        <p14:creationId xmlns:p14="http://schemas.microsoft.com/office/powerpoint/2010/main" val="848222375"/>
       </p:ext>
     </p:extLst>
   </p:cSld>
@@ -3645,8 +3494,8 @@
         </p:nvSpPr>
         <p:spPr>
           <a:xfrm>
-            <a:off x="457200" y="70644"/>
-            <a:ext cx="8229600" cy="407987"/>
+            <a:off x="457200" y="274638"/>
+            <a:ext cx="8229600" cy="423862"/>
           </a:xfrm>
         </p:spPr>
         <p:txBody>
@@ -3657,7 +3506,7 @@
           <a:p>
             <a:r>
               <a:rPr lang="en-US" dirty="0" smtClean="0"/>
-              <a:t>Rules/Soon</a:t>
+              <a:t>Unknowns/needs</a:t>
             </a:r>
             <a:endParaRPr lang="en-US" dirty="0"/>
           </a:p>
@@ -3675,48 +3524,95 @@
         </p:nvSpPr>
         <p:spPr>
           <a:xfrm>
-            <a:off x="457200" y="730250"/>
-            <a:ext cx="8229600" cy="5889625"/>
+            <a:off x="457200" y="968375"/>
+            <a:ext cx="8229600" cy="5746750"/>
           </a:xfrm>
         </p:spPr>
         <p:txBody>
           <a:bodyPr>
-            <a:normAutofit fontScale="85000" lnSpcReduction="20000"/>
+            <a:normAutofit fontScale="62500" lnSpcReduction="20000"/>
           </a:bodyPr>
           <a:lstStyle/>
           <a:p>
             <a:r>
               <a:rPr lang="en-US" dirty="0" smtClean="0"/>
-              <a:t>No update in place, no sparse, full overwrites of files only, enforced by fuse and </a:t>
-            </a:r>
-            <a:r>
-              <a:rPr lang="en-US" dirty="0" err="1" smtClean="0"/>
-              <a:t>pftool</a:t>
-            </a:r>
-            <a:endParaRPr lang="en-US" dirty="0" smtClean="0"/>
-          </a:p>
-          <a:p>
-            <a:r>
-              <a:rPr lang="en-US" dirty="0" smtClean="0"/>
-              <a:t>order</a:t>
-            </a:r>
-          </a:p>
-          <a:p>
-            <a:pPr lvl="1"/>
-            <a:r>
-              <a:rPr lang="en-US" dirty="0" smtClean="0"/>
-              <a:t>now</a:t>
-            </a:r>
-          </a:p>
-          <a:p>
-            <a:pPr lvl="2"/>
-            <a:r>
-              <a:rPr lang="en-US" dirty="0" err="1" smtClean="0"/>
-              <a:t>Pftool</a:t>
-            </a:r>
-            <a:r>
-              <a:rPr lang="en-US" dirty="0" smtClean="0"/>
-              <a:t> mods for base function with uni, multi, and striped files (consider packed files for now or later, but now would be nice given small files – makes it easy on the object system **), obey in some lazy way quota, unlink/</a:t>
+              <a:t>Does </a:t>
+            </a:r>
+            <a:r>
+              <a:rPr lang="en-US" dirty="0" err="1" smtClean="0"/>
+              <a:t>ilm</a:t>
+            </a:r>
+            <a:r>
+              <a:rPr lang="en-US" dirty="0" smtClean="0"/>
+              <a:t> support </a:t>
+            </a:r>
+            <a:r>
+              <a:rPr lang="en-US" dirty="0" err="1" smtClean="0"/>
+              <a:t>xattr</a:t>
+            </a:r>
+            <a:r>
+              <a:rPr lang="en-US" dirty="0" smtClean="0"/>
+              <a:t> queries, might effect if we use xattrs or just put all </a:t>
+            </a:r>
+            <a:r>
+              <a:rPr lang="en-US" dirty="0" err="1" smtClean="0"/>
+              <a:t>metameta</a:t>
+            </a:r>
+            <a:r>
+              <a:rPr lang="en-US" dirty="0" smtClean="0"/>
+              <a:t> data in the </a:t>
+            </a:r>
+            <a:r>
+              <a:rPr lang="en-US" dirty="0" err="1" smtClean="0"/>
+              <a:t>gpfs</a:t>
+            </a:r>
+            <a:r>
+              <a:rPr lang="en-US" dirty="0" smtClean="0"/>
+              <a:t> file   </a:t>
+            </a:r>
+            <a:r>
+              <a:rPr lang="en-US" dirty="0" smtClean="0">
+                <a:solidFill>
+                  <a:srgbClr val="FF0000"/>
+                </a:solidFill>
+              </a:rPr>
+              <a:t>yes but need to test performance</a:t>
+            </a:r>
+          </a:p>
+          <a:p>
+            <a:r>
+              <a:rPr lang="en-US" dirty="0" smtClean="0"/>
+              <a:t>Can we use </a:t>
+            </a:r>
+            <a:r>
+              <a:rPr lang="en-US" dirty="0" err="1" smtClean="0"/>
+              <a:t>gpfs</a:t>
+            </a:r>
+            <a:r>
+              <a:rPr lang="en-US" dirty="0" smtClean="0"/>
+              <a:t> quotas in any useful way or just roll our own lazy quota system (as designed in previous slides) </a:t>
+            </a:r>
+            <a:r>
+              <a:rPr lang="en-US" dirty="0" smtClean="0">
+                <a:solidFill>
+                  <a:srgbClr val="FF0000"/>
+                </a:solidFill>
+              </a:rPr>
+              <a:t>need our own, pretty easy though</a:t>
+            </a:r>
+          </a:p>
+          <a:p>
+            <a:r>
+              <a:rPr lang="en-US" dirty="0" smtClean="0"/>
+              <a:t>Make sure </a:t>
+            </a:r>
+            <a:r>
+              <a:rPr lang="en-US" dirty="0" err="1" smtClean="0"/>
+              <a:t>gpfs</a:t>
+            </a:r>
+            <a:r>
+              <a:rPr lang="en-US" dirty="0" smtClean="0"/>
+              <a:t> does sparse when you </a:t>
             </a:r>
             <a:r>
               <a:rPr lang="en-US" dirty="0" err="1" smtClean="0"/>
@@ -3724,14 +3620,43 @@
             </a:r>
             <a:r>
               <a:rPr lang="en-US" dirty="0" smtClean="0"/>
-              <a:t> is move to trash, object security somehow</a:t>
-            </a:r>
-          </a:p>
-          <a:p>
-            <a:pPr lvl="2"/>
-            <a:r>
-              <a:rPr lang="en-US" dirty="0" smtClean="0"/>
-              <a:t>Backup of </a:t>
+              <a:t> a file to X size, makes it possible for us to use size field and not add an </a:t>
+            </a:r>
+            <a:r>
+              <a:rPr lang="en-US" dirty="0" err="1" smtClean="0"/>
+              <a:t>xattr</a:t>
+            </a:r>
+            <a:r>
+              <a:rPr lang="en-US" dirty="0" smtClean="0"/>
+              <a:t> for file size </a:t>
+            </a:r>
+            <a:r>
+              <a:rPr lang="en-US" dirty="0" smtClean="0">
+                <a:solidFill>
+                  <a:srgbClr val="FF0000"/>
+                </a:solidFill>
+              </a:rPr>
+              <a:t>ok</a:t>
+            </a:r>
+          </a:p>
+          <a:p>
+            <a:r>
+              <a:rPr lang="en-US" dirty="0" smtClean="0"/>
+              <a:t>Security model for object store, compatible with user security somehow found two potential ways</a:t>
+            </a:r>
+            <a:r>
+              <a:rPr lang="en-US" dirty="0" smtClean="0">
+                <a:solidFill>
+                  <a:srgbClr val="FF0000"/>
+                </a:solidFill>
+              </a:rPr>
+              <a:t>, master object user with secret is most likely</a:t>
+            </a:r>
+          </a:p>
+          <a:p>
+            <a:r>
+              <a:rPr lang="en-US" dirty="0" smtClean="0"/>
+              <a:t>Speed/size planning for </a:t>
             </a:r>
             <a:r>
               <a:rPr lang="en-US" dirty="0" err="1" smtClean="0"/>
@@ -3739,75 +3664,39 @@
             </a:r>
             <a:r>
               <a:rPr lang="en-US" dirty="0" smtClean="0"/>
-              <a:t>, batch/demand update of lazy </a:t>
-            </a:r>
-            <a:r>
-              <a:rPr lang="en-US" dirty="0" err="1" smtClean="0"/>
-              <a:t>filesys</a:t>
-            </a:r>
-            <a:r>
-              <a:rPr lang="en-US" dirty="0" smtClean="0"/>
-              <a:t> info for quotas/etc., garbage collection/reclaim/repack</a:t>
-            </a:r>
-          </a:p>
-          <a:p>
-            <a:pPr lvl="2"/>
-            <a:r>
-              <a:rPr lang="en-US" dirty="0" smtClean="0"/>
-              <a:t>Simple fuse (could be deferred but would prefer at least some function) – could be just </a:t>
-            </a:r>
-            <a:r>
-              <a:rPr lang="en-US" dirty="0" err="1" smtClean="0"/>
-              <a:t>fs</a:t>
-            </a:r>
-            <a:r>
-              <a:rPr lang="en-US" dirty="0" smtClean="0"/>
-              <a:t>, </a:t>
-            </a:r>
-            <a:r>
-              <a:rPr lang="en-US" dirty="0" err="1" smtClean="0"/>
-              <a:t>dir</a:t>
-            </a:r>
-            <a:r>
-              <a:rPr lang="en-US" dirty="0" smtClean="0"/>
-              <a:t>/stat, and read only, might be write but don</a:t>
-            </a:r>
-            <a:r>
-              <a:rPr lang="fr-FR" dirty="0" smtClean="0"/>
-              <a:t>’</a:t>
-            </a:r>
-            <a:r>
-              <a:rPr lang="en-US" dirty="0" smtClean="0"/>
-              <a:t>t do packed files or striped files, obey quota, unlink/</a:t>
-            </a:r>
-            <a:r>
-              <a:rPr lang="en-US" dirty="0" err="1" smtClean="0"/>
-              <a:t>trunc</a:t>
-            </a:r>
-            <a:r>
-              <a:rPr lang="en-US" dirty="0" smtClean="0"/>
-              <a:t> is move to trash, enforce complete overwrite only, objects security somehow</a:t>
-            </a:r>
-          </a:p>
-          <a:p>
-            <a:pPr lvl="2"/>
-            <a:r>
-              <a:rPr lang="en-US" dirty="0" smtClean="0"/>
-              <a:t>Some simple batch data mover code for maintenance.</a:t>
-            </a:r>
-          </a:p>
-          <a:p>
-            <a:pPr lvl="2"/>
-            <a:r>
-              <a:rPr lang="en-US" dirty="0" smtClean="0"/>
-              <a:t>Use centralized user/group services</a:t>
-            </a:r>
-          </a:p>
-          <a:p>
-            <a:pPr lvl="2"/>
-            <a:r>
-              <a:rPr lang="en-US" dirty="0" smtClean="0"/>
-              <a:t>Probably create separate </a:t>
+              <a:t> metadata nodes/storage – could use the EMC flash array for testing</a:t>
+            </a:r>
+          </a:p>
+          <a:p>
+            <a:r>
+              <a:rPr lang="en-US" dirty="0" smtClean="0"/>
+              <a:t>Speed/size planning for object, push for V2 of erasure lib, using optimal object size, how much memory, how much BW do you get, can you enumerate object metadata for backup (not a show stopper)</a:t>
+            </a:r>
+          </a:p>
+          <a:p>
+            <a:r>
+              <a:rPr lang="en-US" dirty="0" smtClean="0"/>
+              <a:t>Make sure erasure object works works reasonably well with SMR</a:t>
+            </a:r>
+          </a:p>
+          <a:p>
+            <a:r>
+              <a:rPr lang="en-US" dirty="0" smtClean="0"/>
+              <a:t>Does fuse always provide a close so you can update size/date on close or do you have to poke size and date on all writes?  I think it gives you a close no matter what, not a show stopper, just need to know  </a:t>
+            </a:r>
+            <a:r>
+              <a:rPr lang="en-US" dirty="0" smtClean="0">
+                <a:solidFill>
+                  <a:srgbClr val="FF0000"/>
+                </a:solidFill>
+              </a:rPr>
+              <a:t>(yes it does)</a:t>
+            </a:r>
+          </a:p>
+          <a:p>
+            <a:r>
+              <a:rPr lang="en-US" dirty="0" smtClean="0"/>
+              <a:t>Determine how to hide the </a:t>
             </a:r>
             <a:r>
               <a:rPr lang="en-US" dirty="0" err="1" smtClean="0"/>
@@ -3815,31 +3704,34 @@
             </a:r>
             <a:r>
               <a:rPr lang="en-US" dirty="0" smtClean="0"/>
-              <a:t> </a:t>
-            </a:r>
-            <a:r>
-              <a:rPr lang="en-US" dirty="0" err="1" smtClean="0"/>
-              <a:t>fs</a:t>
-            </a:r>
-            <a:r>
-              <a:rPr lang="en-US" dirty="0" smtClean="0"/>
-              <a:t> to limit exposure and enable parallel </a:t>
-            </a:r>
-            <a:r>
-              <a:rPr lang="en-US" dirty="0" err="1" smtClean="0"/>
-              <a:t>ilm</a:t>
-            </a:r>
-            <a:r>
-              <a:rPr lang="en-US" dirty="0" smtClean="0"/>
-              <a:t>, etc.</a:t>
-            </a:r>
+              <a:t> metadata only name space from general user shells, via </a:t>
+            </a:r>
+            <a:r>
+              <a:rPr lang="en-US" dirty="0" err="1" smtClean="0"/>
+              <a:t>unshare</a:t>
+            </a:r>
+            <a:r>
+              <a:rPr lang="en-US" dirty="0" smtClean="0"/>
+              <a:t>/mount bind or other clever mechanisms  </a:t>
+            </a:r>
+            <a:r>
+              <a:rPr lang="en-US" dirty="0" smtClean="0">
+                <a:solidFill>
+                  <a:srgbClr val="FF0000"/>
+                </a:solidFill>
+              </a:rPr>
+              <a:t>(looks like there are ways to do this)</a:t>
+            </a:r>
+          </a:p>
+          <a:p>
+            <a:endParaRPr lang="en-US" dirty="0"/>
           </a:p>
         </p:txBody>
       </p:sp>
     </p:spTree>
     <p:extLst>
       <p:ext uri="{BB962C8B-B14F-4D97-AF65-F5344CB8AC3E}">
-        <p14:creationId xmlns:p14="http://schemas.microsoft.com/office/powerpoint/2010/main" val="2547314434"/>
+        <p14:creationId xmlns:p14="http://schemas.microsoft.com/office/powerpoint/2010/main" val="2262753033"/>
       </p:ext>
     </p:extLst>
   </p:cSld>
@@ -3878,8 +3770,8 @@
         </p:nvSpPr>
         <p:spPr>
           <a:xfrm>
-            <a:off x="457200" y="163513"/>
-            <a:ext cx="8229600" cy="487362"/>
+            <a:off x="457200" y="70644"/>
+            <a:ext cx="8229600" cy="407987"/>
           </a:xfrm>
         </p:spPr>
         <p:txBody>
@@ -3890,7 +3782,7 @@
           <a:p>
             <a:r>
               <a:rPr lang="en-US" dirty="0" smtClean="0"/>
-              <a:t>Later</a:t>
+              <a:t>Rules/Soon</a:t>
             </a:r>
             <a:endParaRPr lang="en-US" dirty="0"/>
           </a:p>
@@ -3908,131 +3800,63 @@
         </p:nvSpPr>
         <p:spPr>
           <a:xfrm>
-            <a:off x="457200" y="762001"/>
-            <a:ext cx="8229600" cy="6096000"/>
+            <a:off x="457200" y="730250"/>
+            <a:ext cx="8229600" cy="5889625"/>
           </a:xfrm>
         </p:spPr>
         <p:txBody>
           <a:bodyPr>
-            <a:normAutofit fontScale="55000" lnSpcReduction="20000"/>
+            <a:normAutofit fontScale="85000" lnSpcReduction="20000"/>
           </a:bodyPr>
           <a:lstStyle/>
           <a:p>
             <a:r>
               <a:rPr lang="en-US" dirty="0" smtClean="0"/>
-              <a:t>Offline, latency optimizations/sorting</a:t>
-            </a:r>
-          </a:p>
-          <a:p>
-            <a:r>
-              <a:rPr lang="en-US" dirty="0" smtClean="0"/>
-              <a:t>Maybe append or sparse support, need to consider carefully</a:t>
-            </a:r>
-          </a:p>
-          <a:p>
-            <a:r>
-              <a:rPr lang="en-US" dirty="0" smtClean="0"/>
-              <a:t>Other access methods than </a:t>
-            </a:r>
-            <a:r>
-              <a:rPr lang="en-US" dirty="0" err="1" smtClean="0"/>
-              <a:t>cdni</a:t>
-            </a:r>
-            <a:r>
-              <a:rPr lang="en-US" dirty="0" smtClean="0"/>
-              <a:t>/object, </a:t>
-            </a:r>
-            <a:r>
-              <a:rPr lang="en-US" dirty="0" err="1" smtClean="0"/>
-              <a:t>hpss</a:t>
-            </a:r>
-            <a:r>
-              <a:rPr lang="en-US" dirty="0" smtClean="0"/>
-              <a:t>, remote, etc.</a:t>
-            </a:r>
-          </a:p>
-          <a:p>
-            <a:r>
-              <a:rPr lang="en-US" dirty="0" smtClean="0"/>
-              <a:t>HDFS alternate access of same data</a:t>
-            </a:r>
-          </a:p>
-          <a:p>
-            <a:r>
-              <a:rPr lang="en-US" dirty="0" smtClean="0"/>
-              <a:t>Would be nice to have restart for big files but that could be deferred</a:t>
-            </a:r>
-          </a:p>
-          <a:p>
-            <a:r>
-              <a:rPr lang="en-US" dirty="0" smtClean="0"/>
-              <a:t>Packed file support could be later but would be nice to have sooner to make it easy on object system</a:t>
-            </a:r>
-          </a:p>
-          <a:p>
-            <a:r>
-              <a:rPr lang="en-US" dirty="0" smtClean="0"/>
-              <a:t>Compression, encryption, remote copies, semantic copies, etc.</a:t>
-            </a:r>
-          </a:p>
-          <a:p>
-            <a:r>
-              <a:rPr lang="en-US" dirty="0" smtClean="0"/>
-              <a:t>Back up of object level metadata</a:t>
-            </a:r>
-          </a:p>
-          <a:p>
-            <a:r>
-              <a:rPr lang="en-US" dirty="0" smtClean="0"/>
-              <a:t>Fancier lazy </a:t>
-            </a:r>
-            <a:r>
-              <a:rPr lang="en-US" dirty="0" err="1" smtClean="0"/>
-              <a:t>fsinfo</a:t>
-            </a:r>
-            <a:r>
-              <a:rPr lang="en-US" dirty="0" smtClean="0"/>
-              <a:t> like indexing</a:t>
-            </a:r>
-          </a:p>
-          <a:p>
-            <a:r>
-              <a:rPr lang="en-US" dirty="0" smtClean="0"/>
-              <a:t>User supplied </a:t>
-            </a:r>
-            <a:r>
-              <a:rPr lang="en-US" dirty="0" err="1" smtClean="0"/>
-              <a:t>xattr</a:t>
-            </a:r>
-            <a:r>
-              <a:rPr lang="en-US" dirty="0" smtClean="0"/>
-              <a:t> with search (indexing)</a:t>
-            </a:r>
-          </a:p>
-          <a:p>
-            <a:r>
-              <a:rPr lang="en-US" dirty="0" smtClean="0"/>
-              <a:t>Would like to have V2 of erasure lib sooner than later but could wait, </a:t>
-            </a:r>
-            <a:r>
-              <a:rPr lang="en-US" dirty="0" err="1" smtClean="0"/>
-              <a:t>bw</a:t>
-            </a:r>
-            <a:r>
-              <a:rPr lang="en-US" dirty="0" smtClean="0"/>
-              <a:t> suffers</a:t>
-            </a:r>
-          </a:p>
-          <a:p>
-            <a:r>
-              <a:rPr lang="en-US" dirty="0" smtClean="0"/>
-              <a:t>Offline deep reconcile/repack – if trash is lost</a:t>
-            </a:r>
-          </a:p>
-          <a:p>
-            <a:r>
-              <a:rPr lang="en-US" dirty="0" smtClean="0"/>
-              <a:t>Investigate </a:t>
+              <a:t>No update in place, no sparse, full overwrites of files only, enforced by fuse and </a:t>
+            </a:r>
+            <a:r>
+              <a:rPr lang="en-US" dirty="0" err="1" smtClean="0"/>
+              <a:t>pftool</a:t>
+            </a:r>
+            <a:endParaRPr lang="en-US" dirty="0" smtClean="0"/>
+          </a:p>
+          <a:p>
+            <a:r>
+              <a:rPr lang="en-US" dirty="0" smtClean="0"/>
+              <a:t>order</a:t>
+            </a:r>
+          </a:p>
+          <a:p>
+            <a:pPr lvl="1"/>
+            <a:r>
+              <a:rPr lang="en-US" dirty="0" smtClean="0"/>
+              <a:t>now</a:t>
+            </a:r>
+          </a:p>
+          <a:p>
+            <a:pPr lvl="2"/>
+            <a:r>
+              <a:rPr lang="en-US" dirty="0" err="1" smtClean="0"/>
+              <a:t>Pftool</a:t>
+            </a:r>
+            <a:r>
+              <a:rPr lang="en-US" dirty="0" smtClean="0"/>
+              <a:t> mods for base function with uni, multi, and striped files (consider packed files for now or later, but now would be nice given small files – makes it easy on the object system **), obey in some lazy way quota, unlink/</a:t>
+            </a:r>
+            <a:r>
+              <a:rPr lang="en-US" dirty="0" err="1" smtClean="0"/>
+              <a:t>trunc</a:t>
+            </a:r>
+            <a:r>
+              <a:rPr lang="en-US" dirty="0" smtClean="0"/>
+              <a:t> is move to trash, object security somehow</a:t>
+            </a:r>
+          </a:p>
+          <a:p>
+            <a:pPr lvl="2"/>
+            <a:r>
+              <a:rPr lang="en-US" dirty="0" smtClean="0"/>
+              <a:t>Backup of </a:t>
             </a:r>
             <a:r>
               <a:rPr lang="en-US" dirty="0" err="1" smtClean="0"/>
@@ -4040,69 +3864,107 @@
             </a:r>
             <a:r>
               <a:rPr lang="en-US" dirty="0" smtClean="0"/>
-              <a:t> keeping track of changes for further optimizations of batch processes (only process changed parts of the tree</a:t>
-            </a:r>
-          </a:p>
-          <a:p>
-            <a:r>
-              <a:rPr lang="en-US" dirty="0" smtClean="0"/>
-              <a:t>Fuse packing on write, fuse multipart write  (maybe)</a:t>
-            </a:r>
-          </a:p>
-          <a:p>
-            <a:r>
-              <a:rPr lang="en-US" dirty="0" smtClean="0"/>
-              <a:t>May need a special way to load data from </a:t>
-            </a:r>
-            <a:r>
-              <a:rPr lang="en-US" dirty="0" err="1" smtClean="0"/>
-              <a:t>hpss</a:t>
-            </a:r>
-            <a:r>
-              <a:rPr lang="en-US" dirty="0" smtClean="0"/>
-              <a:t> to campaign that is very large, as we will need multi-part thru fuse or some other special way, in short term we could force this to go to scratch first for a while.  Moving it from </a:t>
-            </a:r>
-            <a:r>
-              <a:rPr lang="en-US" dirty="0" err="1" smtClean="0"/>
-              <a:t>hpss</a:t>
-            </a:r>
-            <a:r>
-              <a:rPr lang="en-US" dirty="0" smtClean="0"/>
-              <a:t> is the hard part, once on scratch it would go fast to campaign, but need to figure a good way to do this at some point</a:t>
-            </a:r>
-          </a:p>
-          <a:p>
-            <a:r>
-              <a:rPr lang="en-US" dirty="0" smtClean="0"/>
-              <a:t>May want to do other optimizations to HPSS, like </a:t>
-            </a:r>
-            <a:r>
-              <a:rPr lang="en-US" dirty="0" err="1" smtClean="0"/>
-              <a:t>htar</a:t>
-            </a:r>
-            <a:r>
-              <a:rPr lang="en-US" dirty="0" smtClean="0"/>
-              <a:t> leveraging our packing</a:t>
-            </a:r>
-          </a:p>
-          <a:p>
-            <a:endParaRPr lang="en-US" dirty="0" smtClean="0"/>
-          </a:p>
-          <a:p>
-            <a:endParaRPr lang="en-US" dirty="0" smtClean="0"/>
-          </a:p>
-          <a:p>
-            <a:endParaRPr lang="en-US" dirty="0" smtClean="0"/>
-          </a:p>
-          <a:p>
-            <a:endParaRPr lang="en-US" dirty="0"/>
+              <a:t>, batch/demand update of lazy </a:t>
+            </a:r>
+            <a:r>
+              <a:rPr lang="en-US" dirty="0" err="1" smtClean="0"/>
+              <a:t>filesys</a:t>
+            </a:r>
+            <a:r>
+              <a:rPr lang="en-US" dirty="0" smtClean="0"/>
+              <a:t> info for quotas/etc., garbage collection/reclaim/repack</a:t>
+            </a:r>
+          </a:p>
+          <a:p>
+            <a:pPr lvl="2"/>
+            <a:r>
+              <a:rPr lang="en-US" dirty="0" smtClean="0"/>
+              <a:t>Simple fuse (could be deferred but would prefer at least some function) – could be just </a:t>
+            </a:r>
+            <a:r>
+              <a:rPr lang="en-US" dirty="0" err="1" smtClean="0"/>
+              <a:t>fs</a:t>
+            </a:r>
+            <a:r>
+              <a:rPr lang="en-US" dirty="0" smtClean="0"/>
+              <a:t>, </a:t>
+            </a:r>
+            <a:r>
+              <a:rPr lang="en-US" dirty="0" err="1" smtClean="0"/>
+              <a:t>dir</a:t>
+            </a:r>
+            <a:r>
+              <a:rPr lang="en-US" dirty="0" smtClean="0"/>
+              <a:t>/stat, and read only, might be write but don</a:t>
+            </a:r>
+            <a:r>
+              <a:rPr lang="fr-FR" dirty="0" smtClean="0"/>
+              <a:t>’</a:t>
+            </a:r>
+            <a:r>
+              <a:rPr lang="en-US" dirty="0" smtClean="0"/>
+              <a:t>t do packed files or striped files, obey quota, unlink/</a:t>
+            </a:r>
+            <a:r>
+              <a:rPr lang="en-US" dirty="0" err="1" smtClean="0"/>
+              <a:t>trunc</a:t>
+            </a:r>
+            <a:r>
+              <a:rPr lang="en-US" dirty="0" smtClean="0"/>
+              <a:t> is move to trash, enforce complete overwrite only, objects security somehow</a:t>
+            </a:r>
+          </a:p>
+          <a:p>
+            <a:pPr lvl="2"/>
+            <a:r>
+              <a:rPr lang="en-US" dirty="0" smtClean="0"/>
+              <a:t>Some simple batch data mover code for maintenance.</a:t>
+            </a:r>
+          </a:p>
+          <a:p>
+            <a:pPr lvl="2"/>
+            <a:r>
+              <a:rPr lang="en-US" dirty="0" smtClean="0"/>
+              <a:t>Use centralized user/group services</a:t>
+            </a:r>
+          </a:p>
+          <a:p>
+            <a:pPr lvl="2"/>
+            <a:r>
+              <a:rPr lang="en-US" dirty="0" smtClean="0"/>
+              <a:t>Probably create separate </a:t>
+            </a:r>
+            <a:r>
+              <a:rPr lang="en-US" dirty="0" err="1" smtClean="0"/>
+              <a:t>gpfs</a:t>
+            </a:r>
+            <a:r>
+              <a:rPr lang="en-US" dirty="0" smtClean="0"/>
+              <a:t> </a:t>
+            </a:r>
+            <a:r>
+              <a:rPr lang="en-US" dirty="0" err="1" smtClean="0"/>
+              <a:t>fs</a:t>
+            </a:r>
+            <a:r>
+              <a:rPr lang="en-US" dirty="0" smtClean="0"/>
+              <a:t> to limit exposure and enable parallel </a:t>
+            </a:r>
+            <a:r>
+              <a:rPr lang="en-US" dirty="0" err="1" smtClean="0"/>
+              <a:t>ilm</a:t>
+            </a:r>
+            <a:r>
+              <a:rPr lang="en-US" dirty="0" smtClean="0"/>
+              <a:t>, etc.</a:t>
+            </a:r>
           </a:p>
         </p:txBody>
       </p:sp>
     </p:spTree>
     <p:extLst>
       <p:ext uri="{BB962C8B-B14F-4D97-AF65-F5344CB8AC3E}">
-        <p14:creationId xmlns:p14="http://schemas.microsoft.com/office/powerpoint/2010/main" val="121157684"/>
+        <p14:creationId xmlns:p14="http://schemas.microsoft.com/office/powerpoint/2010/main" val="2547314434"/>
       </p:ext>
     </p:extLst>
   </p:cSld>
@@ -4139,6 +4001,269 @@
             <p:ph type="title"/>
           </p:nvPr>
         </p:nvSpPr>
+        <p:spPr>
+          <a:xfrm>
+            <a:off x="457200" y="163513"/>
+            <a:ext cx="8229600" cy="487362"/>
+          </a:xfrm>
+        </p:spPr>
+        <p:txBody>
+          <a:bodyPr>
+            <a:normAutofit fontScale="90000"/>
+          </a:bodyPr>
+          <a:lstStyle/>
+          <a:p>
+            <a:r>
+              <a:rPr lang="en-US" dirty="0" smtClean="0"/>
+              <a:t>Later</a:t>
+            </a:r>
+            <a:endParaRPr lang="en-US" dirty="0"/>
+          </a:p>
+        </p:txBody>
+      </p:sp>
+      <p:sp>
+        <p:nvSpPr>
+          <p:cNvPr id="3" name="Content Placeholder 2"/>
+          <p:cNvSpPr>
+            <a:spLocks noGrp="1"/>
+          </p:cNvSpPr>
+          <p:nvPr>
+            <p:ph idx="1"/>
+          </p:nvPr>
+        </p:nvSpPr>
+        <p:spPr>
+          <a:xfrm>
+            <a:off x="457200" y="762001"/>
+            <a:ext cx="8229600" cy="6096000"/>
+          </a:xfrm>
+        </p:spPr>
+        <p:txBody>
+          <a:bodyPr>
+            <a:normAutofit fontScale="55000" lnSpcReduction="20000"/>
+          </a:bodyPr>
+          <a:lstStyle/>
+          <a:p>
+            <a:r>
+              <a:rPr lang="en-US" dirty="0" smtClean="0"/>
+              <a:t>Offline, latency optimizations/sorting</a:t>
+            </a:r>
+          </a:p>
+          <a:p>
+            <a:r>
+              <a:rPr lang="en-US" dirty="0" smtClean="0"/>
+              <a:t>Maybe append or sparse support, need to consider carefully</a:t>
+            </a:r>
+          </a:p>
+          <a:p>
+            <a:r>
+              <a:rPr lang="en-US" dirty="0" smtClean="0"/>
+              <a:t>Other access methods than </a:t>
+            </a:r>
+            <a:r>
+              <a:rPr lang="en-US" dirty="0" err="1" smtClean="0"/>
+              <a:t>cdni</a:t>
+            </a:r>
+            <a:r>
+              <a:rPr lang="en-US" dirty="0" smtClean="0"/>
+              <a:t>/object, </a:t>
+            </a:r>
+            <a:r>
+              <a:rPr lang="en-US" dirty="0" err="1" smtClean="0"/>
+              <a:t>hpss</a:t>
+            </a:r>
+            <a:r>
+              <a:rPr lang="en-US" dirty="0" smtClean="0"/>
+              <a:t>, remote, etc.</a:t>
+            </a:r>
+          </a:p>
+          <a:p>
+            <a:r>
+              <a:rPr lang="en-US" dirty="0" smtClean="0"/>
+              <a:t>HDFS alternate access of same data</a:t>
+            </a:r>
+          </a:p>
+          <a:p>
+            <a:r>
+              <a:rPr lang="en-US" dirty="0" smtClean="0"/>
+              <a:t>Would be nice to have restart for big files but that could be deferred</a:t>
+            </a:r>
+          </a:p>
+          <a:p>
+            <a:r>
+              <a:rPr lang="en-US" dirty="0" smtClean="0"/>
+              <a:t>Packed file support could be later but would be nice to have sooner to make it easy on object system</a:t>
+            </a:r>
+          </a:p>
+          <a:p>
+            <a:r>
+              <a:rPr lang="en-US" dirty="0" smtClean="0"/>
+              <a:t>Compression, encryption, remote copies, semantic copies, etc.</a:t>
+            </a:r>
+          </a:p>
+          <a:p>
+            <a:r>
+              <a:rPr lang="en-US" dirty="0" smtClean="0"/>
+              <a:t>Back up of object level metadata</a:t>
+            </a:r>
+          </a:p>
+          <a:p>
+            <a:r>
+              <a:rPr lang="en-US" dirty="0" smtClean="0"/>
+              <a:t>Fancier lazy </a:t>
+            </a:r>
+            <a:r>
+              <a:rPr lang="en-US" dirty="0" err="1" smtClean="0"/>
+              <a:t>fsinfo</a:t>
+            </a:r>
+            <a:r>
+              <a:rPr lang="en-US" dirty="0" smtClean="0"/>
+              <a:t> like indexing</a:t>
+            </a:r>
+          </a:p>
+          <a:p>
+            <a:r>
+              <a:rPr lang="en-US" dirty="0" smtClean="0"/>
+              <a:t>User supplied </a:t>
+            </a:r>
+            <a:r>
+              <a:rPr lang="en-US" dirty="0" err="1" smtClean="0"/>
+              <a:t>xattr</a:t>
+            </a:r>
+            <a:r>
+              <a:rPr lang="en-US" dirty="0" smtClean="0"/>
+              <a:t> with search (indexing)</a:t>
+            </a:r>
+          </a:p>
+          <a:p>
+            <a:r>
+              <a:rPr lang="en-US" dirty="0" smtClean="0"/>
+              <a:t>Would like to have V2 of erasure lib sooner than later but could wait, </a:t>
+            </a:r>
+            <a:r>
+              <a:rPr lang="en-US" dirty="0" err="1" smtClean="0"/>
+              <a:t>bw</a:t>
+            </a:r>
+            <a:r>
+              <a:rPr lang="en-US" dirty="0" smtClean="0"/>
+              <a:t> suffers</a:t>
+            </a:r>
+          </a:p>
+          <a:p>
+            <a:r>
+              <a:rPr lang="en-US" dirty="0" smtClean="0"/>
+              <a:t>Offline deep reconcile/repack – if trash is lost</a:t>
+            </a:r>
+          </a:p>
+          <a:p>
+            <a:r>
+              <a:rPr lang="en-US" dirty="0" smtClean="0"/>
+              <a:t>Investigate </a:t>
+            </a:r>
+            <a:r>
+              <a:rPr lang="en-US" dirty="0" err="1" smtClean="0"/>
+              <a:t>gpfs</a:t>
+            </a:r>
+            <a:r>
+              <a:rPr lang="en-US" dirty="0" smtClean="0"/>
+              <a:t> keeping track of changes for further optimizations of batch processes (only process changed parts of the tree</a:t>
+            </a:r>
+          </a:p>
+          <a:p>
+            <a:r>
+              <a:rPr lang="en-US" dirty="0" smtClean="0"/>
+              <a:t>Fuse packing on write, fuse multipart write  (maybe)</a:t>
+            </a:r>
+          </a:p>
+          <a:p>
+            <a:r>
+              <a:rPr lang="en-US" dirty="0" smtClean="0"/>
+              <a:t>May need a special way to load data from </a:t>
+            </a:r>
+            <a:r>
+              <a:rPr lang="en-US" dirty="0" err="1" smtClean="0"/>
+              <a:t>hpss</a:t>
+            </a:r>
+            <a:r>
+              <a:rPr lang="en-US" dirty="0" smtClean="0"/>
+              <a:t> to campaign that is very large, as we will need multi-part thru fuse or some other special way, in short term we could force this to go to scratch first for a while.  Moving it from </a:t>
+            </a:r>
+            <a:r>
+              <a:rPr lang="en-US" dirty="0" err="1" smtClean="0"/>
+              <a:t>hpss</a:t>
+            </a:r>
+            <a:r>
+              <a:rPr lang="en-US" dirty="0" smtClean="0"/>
+              <a:t> is the hard part, once on scratch it would go fast to campaign, but need to figure a good way to do this at some point</a:t>
+            </a:r>
+          </a:p>
+          <a:p>
+            <a:r>
+              <a:rPr lang="en-US" dirty="0" smtClean="0"/>
+              <a:t>May want to do other optimizations to HPSS, like </a:t>
+            </a:r>
+            <a:r>
+              <a:rPr lang="en-US" dirty="0" err="1" smtClean="0"/>
+              <a:t>htar</a:t>
+            </a:r>
+            <a:r>
+              <a:rPr lang="en-US" dirty="0" smtClean="0"/>
+              <a:t> leveraging our packing</a:t>
+            </a:r>
+          </a:p>
+          <a:p>
+            <a:endParaRPr lang="en-US" dirty="0" smtClean="0"/>
+          </a:p>
+          <a:p>
+            <a:endParaRPr lang="en-US" dirty="0" smtClean="0"/>
+          </a:p>
+          <a:p>
+            <a:endParaRPr lang="en-US" dirty="0" smtClean="0"/>
+          </a:p>
+          <a:p>
+            <a:endParaRPr lang="en-US" dirty="0"/>
+          </a:p>
+        </p:txBody>
+      </p:sp>
+    </p:spTree>
+    <p:extLst>
+      <p:ext uri="{BB962C8B-B14F-4D97-AF65-F5344CB8AC3E}">
+        <p14:creationId xmlns:p14="http://schemas.microsoft.com/office/powerpoint/2010/main" val="121157684"/>
+      </p:ext>
+    </p:extLst>
+  </p:cSld>
+  <p:clrMapOvr>
+    <a:masterClrMapping/>
+  </p:clrMapOvr>
+</p:sld>
+</file>
+
+<file path=ppt/slides/slide15.xml><?xml version="1.0" encoding="utf-8"?>
+<p:sld xmlns:a="http://schemas.openxmlformats.org/drawingml/2006/main" xmlns:r="http://schemas.openxmlformats.org/officeDocument/2006/relationships" xmlns:p="http://schemas.openxmlformats.org/presentationml/2006/main">
+  <p:cSld>
+    <p:spTree>
+      <p:nvGrpSpPr>
+        <p:cNvPr id="1" name=""/>
+        <p:cNvGrpSpPr/>
+        <p:nvPr/>
+      </p:nvGrpSpPr>
+      <p:grpSpPr>
+        <a:xfrm>
+          <a:off x="0" y="0"/>
+          <a:ext cx="0" cy="0"/>
+          <a:chOff x="0" y="0"/>
+          <a:chExt cx="0" cy="0"/>
+        </a:xfrm>
+      </p:grpSpPr>
+      <p:sp>
+        <p:nvSpPr>
+          <p:cNvPr id="2" name="Title 1"/>
+          <p:cNvSpPr>
+            <a:spLocks noGrp="1"/>
+          </p:cNvSpPr>
+          <p:nvPr>
+            <p:ph type="title"/>
+          </p:nvPr>
+        </p:nvSpPr>
         <p:spPr/>
         <p:txBody>
           <a:bodyPr/>
@@ -4259,7 +4384,7 @@
 </p:sld>
 </file>
 
-<file path=ppt/slides/slide15.xml><?xml version="1.0" encoding="utf-8"?>
+<file path=ppt/slides/slide16.xml><?xml version="1.0" encoding="utf-8"?>
 <p:sld xmlns:a="http://schemas.openxmlformats.org/drawingml/2006/main" xmlns:r="http://schemas.openxmlformats.org/officeDocument/2006/relationships" xmlns:p="http://schemas.openxmlformats.org/presentationml/2006/main">
   <p:cSld>
     <p:spTree>
@@ -8575,8 +8700,8 @@
         </p:nvSpPr>
         <p:spPr>
           <a:xfrm>
-            <a:off x="198480" y="722428"/>
-            <a:ext cx="1898522" cy="5909311"/>
+            <a:off x="198480" y="570028"/>
+            <a:ext cx="1898522" cy="6186310"/>
           </a:xfrm>
           <a:prstGeom prst="rect">
             <a:avLst/>
@@ -8663,13 +8788,17 @@
           </a:p>
           <a:p>
             <a:r>
-              <a:rPr lang="en-US" dirty="0"/>
-              <a:t>s</a:t>
-            </a:r>
-            <a:r>
-              <a:rPr lang="en-US" dirty="0" smtClean="0"/>
-              <a:t>write_size</a:t>
-            </a:r>
+              <a:rPr lang="en-US" dirty="0" err="1" smtClean="0"/>
+              <a:t>swrite_size</a:t>
+            </a:r>
+            <a:endParaRPr lang="en-US" dirty="0" smtClean="0"/>
+          </a:p>
+          <a:p>
+            <a:r>
+              <a:rPr lang="en-US" dirty="0" err="1" smtClean="0"/>
+              <a:t>swrite_packsize</a:t>
+            </a:r>
+            <a:endParaRPr lang="en-US" dirty="0" smtClean="0"/>
           </a:p>
           <a:p>
             <a:r>
@@ -8761,7 +8890,7 @@
         <p:spPr>
           <a:xfrm>
             <a:off x="3412599" y="2064129"/>
-            <a:ext cx="1898522" cy="3693319"/>
+            <a:ext cx="1898522" cy="3139321"/>
           </a:xfrm>
           <a:prstGeom prst="rect">
             <a:avLst/>
@@ -8796,9 +8925,10 @@
           </a:p>
           <a:p>
             <a:r>
-              <a:rPr lang="en-US" dirty="0" smtClean="0"/>
-              <a:t>path</a:t>
-            </a:r>
+              <a:rPr lang="en-US" smtClean="0"/>
+              <a:t>URLprefix</a:t>
+            </a:r>
+            <a:endParaRPr lang="en-US" dirty="0" smtClean="0"/>
           </a:p>
           <a:p>
             <a:r>
@@ -8816,15 +8946,16 @@
           <a:p>
             <a:r>
               <a:rPr lang="en-US" dirty="0" err="1" smtClean="0"/>
-              <a:t>securitymethod</a:t>
+              <a:t>Securitymethod</a:t>
             </a:r>
             <a:endParaRPr lang="en-US" dirty="0" smtClean="0"/>
           </a:p>
           <a:p>
             <a:r>
-              <a:rPr lang="en-US" dirty="0" smtClean="0"/>
-              <a:t>enctype</a:t>
-            </a:r>
+              <a:rPr lang="en-US" dirty="0" err="1" smtClean="0"/>
+              <a:t>sectype</a:t>
+            </a:r>
+            <a:endParaRPr lang="en-US" dirty="0" smtClean="0"/>
           </a:p>
           <a:p>
             <a:r>
@@ -8858,41 +8989,21 @@
           </a:p>
           <a:p>
             <a:r>
-              <a:rPr lang="en-US" dirty="0"/>
-              <a:t>l</a:t>
-            </a:r>
-            <a:r>
-              <a:rPr lang="en-US" dirty="0" smtClean="0"/>
-              <a:t>atency</a:t>
-            </a:r>
-          </a:p>
-          <a:p>
-            <a:r>
-              <a:rPr lang="en-US" dirty="0"/>
-              <a:t>d</a:t>
-            </a:r>
-            <a:r>
-              <a:rPr lang="en-US" dirty="0" smtClean="0"/>
-              <a:t>irty_percent</a:t>
-            </a:r>
-          </a:p>
-          <a:p>
-            <a:r>
-              <a:rPr lang="en-US" dirty="0" smtClean="0"/>
-              <a:t>packsmall</a:t>
-            </a:r>
-          </a:p>
-        </p:txBody>
-      </p:sp>
-      <p:sp>
-        <p:nvSpPr>
-          <p:cNvPr id="8" name="TextBox 7"/>
+              <a:rPr lang="en-US" dirty="0" smtClean="0"/>
+              <a:t>latency</a:t>
+            </a:r>
+          </a:p>
+        </p:txBody>
+      </p:sp>
+      <p:sp>
+        <p:nvSpPr>
+          <p:cNvPr id="9" name="TextBox 8"/>
           <p:cNvSpPr txBox="1"/>
           <p:nvPr/>
         </p:nvSpPr>
         <p:spPr>
           <a:xfrm>
-            <a:off x="4787412" y="6214938"/>
+            <a:off x="147680" y="148684"/>
             <a:ext cx="2051984" cy="369332"/>
           </a:xfrm>
           <a:prstGeom prst="rect">
@@ -8913,41 +9024,6 @@
           <a:p>
             <a:r>
               <a:rPr lang="en-US" dirty="0" smtClean="0"/>
-              <a:t>Config Version</a:t>
-            </a:r>
-            <a:endParaRPr lang="en-US" dirty="0"/>
-          </a:p>
-        </p:txBody>
-      </p:sp>
-      <p:sp>
-        <p:nvSpPr>
-          <p:cNvPr id="9" name="TextBox 8"/>
-          <p:cNvSpPr txBox="1"/>
-          <p:nvPr/>
-        </p:nvSpPr>
-        <p:spPr>
-          <a:xfrm>
-            <a:off x="147680" y="288384"/>
-            <a:ext cx="2051984" cy="369332"/>
-          </a:xfrm>
-          <a:prstGeom prst="rect">
-            <a:avLst/>
-          </a:prstGeom>
-          <a:noFill/>
-          <a:ln>
-            <a:solidFill>
-              <a:schemeClr val="tx1"/>
-            </a:solidFill>
-          </a:ln>
-        </p:spPr>
-        <p:txBody>
-          <a:bodyPr wrap="square" rtlCol="0">
-            <a:spAutoFit/>
-          </a:bodyPr>
-          <a:lstStyle/>
-          <a:p>
-            <a:r>
-              <a:rPr lang="en-US" dirty="0" smtClean="0"/>
               <a:t>Mount mntpoint</a:t>
             </a:r>
             <a:endParaRPr lang="en-US" dirty="0"/>
@@ -8962,8 +9038,8 @@
         </p:nvCxnSpPr>
         <p:spPr>
           <a:xfrm>
-            <a:off x="1409700" y="2599895"/>
-            <a:ext cx="2002899" cy="1"/>
+            <a:off x="1409700" y="2500960"/>
+            <a:ext cx="2002899" cy="98936"/>
           </a:xfrm>
           <a:prstGeom prst="straightConnector1">
             <a:avLst/>
@@ -8996,7 +9072,7 @@
         <p:spPr>
           <a:xfrm flipV="1">
             <a:off x="1409700" y="2599896"/>
-            <a:ext cx="2002899" cy="524304"/>
+            <a:ext cx="2002899" cy="397304"/>
           </a:xfrm>
           <a:prstGeom prst="straightConnector1">
             <a:avLst/>
@@ -9127,8 +9203,8 @@
         </p:nvSpPr>
         <p:spPr>
           <a:xfrm>
-            <a:off x="6049083" y="2064129"/>
-            <a:ext cx="2972168" cy="3139321"/>
+            <a:off x="6049083" y="1368761"/>
+            <a:ext cx="2972168" cy="4616648"/>
           </a:xfrm>
           <a:prstGeom prst="rect">
             <a:avLst/>
@@ -9153,105 +9229,268 @@
           </a:p>
           <a:p>
             <a:r>
-              <a:rPr lang="en-US" dirty="0" smtClean="0"/>
-              <a:t>objrepo</a:t>
-            </a:r>
-          </a:p>
-          <a:p>
-            <a:r>
-              <a:rPr lang="en-US" dirty="0" smtClean="0"/>
-              <a:t>objid </a:t>
-            </a:r>
-            <a:r>
-              <a:rPr lang="en-US" sz="1400" dirty="0"/>
-              <a:t>(unique or </a:t>
-            </a:r>
-            <a:r>
-              <a:rPr lang="en-US" sz="1400" dirty="0" smtClean="0"/>
-              <a:t>file(multi-part))</a:t>
-            </a:r>
-            <a:endParaRPr lang="en-US" sz="1400" dirty="0"/>
+              <a:rPr lang="en-US" dirty="0" err="1" smtClean="0"/>
+              <a:t>Objid</a:t>
+            </a:r>
+            <a:endParaRPr lang="en-US" dirty="0" smtClean="0"/>
           </a:p>
           <a:p>
             <a:r>
               <a:rPr lang="en-US" dirty="0"/>
-              <a:t>o</a:t>
-            </a:r>
-            <a:r>
-              <a:rPr lang="en-US" dirty="0" smtClean="0"/>
-              <a:t>bjtype </a:t>
-            </a:r>
-            <a:r>
-              <a:rPr lang="en-US" sz="1400" dirty="0" smtClean="0"/>
-              <a:t>(uni, multi, packed, striped)</a:t>
-            </a:r>
+              <a:t>	</a:t>
+            </a:r>
+            <a:r>
+              <a:rPr lang="en-US" sz="1200" dirty="0" smtClean="0"/>
+              <a:t>record version</a:t>
+            </a:r>
+          </a:p>
+          <a:p>
+            <a:r>
+              <a:rPr lang="en-US" sz="1200" dirty="0"/>
+              <a:t>	</a:t>
+            </a:r>
+            <a:r>
+              <a:rPr lang="en-US" sz="1200" dirty="0" err="1" smtClean="0"/>
+              <a:t>mdfile</a:t>
+            </a:r>
+            <a:r>
+              <a:rPr lang="en-US" sz="1200" dirty="0" smtClean="0"/>
+              <a:t> create time</a:t>
+            </a:r>
+            <a:endParaRPr lang="en-US" sz="1200" dirty="0"/>
+          </a:p>
+          <a:p>
+            <a:r>
+              <a:rPr lang="en-US" sz="1200" dirty="0"/>
+              <a:t>	</a:t>
+            </a:r>
+            <a:r>
+              <a:rPr lang="en-US" sz="1200" dirty="0" smtClean="0"/>
+              <a:t>Object Packed or Not</a:t>
+            </a:r>
+          </a:p>
+          <a:p>
+            <a:r>
+              <a:rPr lang="en-US" sz="1200" dirty="0"/>
+              <a:t>	</a:t>
+            </a:r>
+            <a:r>
+              <a:rPr lang="en-US" sz="1200" dirty="0" err="1" smtClean="0"/>
+              <a:t>comptype</a:t>
+            </a:r>
+            <a:endParaRPr lang="en-US" sz="1200" dirty="0" smtClean="0"/>
+          </a:p>
+          <a:p>
+            <a:r>
+              <a:rPr lang="en-US" sz="1200" dirty="0"/>
+              <a:t>	</a:t>
+            </a:r>
+            <a:r>
+              <a:rPr lang="en-US" sz="1200" dirty="0" err="1" smtClean="0"/>
+              <a:t>securitytype</a:t>
+            </a:r>
+            <a:endParaRPr lang="en-US" sz="1200" dirty="0" smtClean="0"/>
+          </a:p>
+          <a:p>
+            <a:r>
+              <a:rPr lang="en-US" sz="1200" dirty="0"/>
+              <a:t>	</a:t>
+            </a:r>
+            <a:r>
+              <a:rPr lang="en-US" sz="1200" dirty="0" err="1" smtClean="0"/>
+              <a:t>correctnesstype</a:t>
+            </a:r>
+            <a:endParaRPr lang="en-US" sz="1200" dirty="0" smtClean="0"/>
+          </a:p>
+          <a:p>
+            <a:r>
+              <a:rPr lang="en-US" sz="1200" dirty="0"/>
+              <a:t>	</a:t>
+            </a:r>
+            <a:r>
+              <a:rPr lang="en-US" sz="1200" dirty="0" err="1" smtClean="0"/>
+              <a:t>chunksize</a:t>
+            </a:r>
+            <a:endParaRPr lang="en-US" sz="1200" dirty="0" smtClean="0"/>
+          </a:p>
+          <a:p>
+            <a:r>
+              <a:rPr lang="en-US" sz="1200" dirty="0"/>
+              <a:t>	</a:t>
+            </a:r>
+            <a:r>
+              <a:rPr lang="en-US" sz="1200" dirty="0" err="1" smtClean="0"/>
+              <a:t>chunknumber</a:t>
+            </a:r>
+            <a:endParaRPr lang="en-US" sz="1200" dirty="0" smtClean="0"/>
+          </a:p>
+          <a:p>
+            <a:r>
+              <a:rPr lang="en-US" sz="1200" dirty="0"/>
+              <a:t>	</a:t>
+            </a:r>
+            <a:r>
+              <a:rPr lang="en-US" sz="1200" dirty="0" err="1" smtClean="0"/>
+              <a:t>mdfileinode</a:t>
+            </a:r>
+            <a:endParaRPr lang="en-US" sz="1200" dirty="0" smtClean="0"/>
+          </a:p>
+          <a:p>
+            <a:r>
+              <a:rPr lang="en-US" dirty="0" err="1" smtClean="0"/>
+              <a:t>Objpost</a:t>
+            </a:r>
+            <a:endParaRPr lang="en-US" dirty="0" smtClean="0"/>
           </a:p>
           <a:p>
             <a:r>
               <a:rPr lang="en-US" dirty="0"/>
-              <a:t>o</a:t>
-            </a:r>
-            <a:r>
-              <a:rPr lang="en-US" dirty="0" smtClean="0"/>
-              <a:t>bjoffset </a:t>
-            </a:r>
-            <a:r>
-              <a:rPr lang="en-US" sz="1400" dirty="0"/>
-              <a:t>(for packed)</a:t>
-            </a:r>
-          </a:p>
-          <a:p>
-            <a:r>
-              <a:rPr lang="en-US" dirty="0" err="1" smtClean="0"/>
-              <a:t>objchnksize</a:t>
-            </a:r>
-            <a:endParaRPr lang="en-US" dirty="0" smtClean="0"/>
-          </a:p>
-          <a:p>
-            <a:r>
-              <a:rPr lang="en-US" dirty="0" err="1" smtClean="0"/>
-              <a:t>objconfversion</a:t>
-            </a:r>
-            <a:endParaRPr lang="en-US" dirty="0" smtClean="0"/>
-          </a:p>
-          <a:p>
-            <a:r>
-              <a:rPr lang="en-US" dirty="0" smtClean="0"/>
-              <a:t>objcorrectinfo </a:t>
-            </a:r>
-            <a:r>
-              <a:rPr lang="en-US" sz="1400" dirty="0"/>
-              <a:t>(unique)</a:t>
-            </a:r>
-          </a:p>
-          <a:p>
-            <a:r>
-              <a:rPr lang="en-US" dirty="0" smtClean="0"/>
-              <a:t>objrestart </a:t>
-            </a:r>
-            <a:r>
-              <a:rPr lang="en-US" sz="1400" dirty="0"/>
-              <a:t>(mid update</a:t>
-            </a:r>
-            <a:r>
-              <a:rPr lang="en-US" sz="1400" dirty="0" smtClean="0"/>
+              <a:t>	</a:t>
+            </a:r>
+            <a:r>
+              <a:rPr lang="en-US" sz="1200" dirty="0" smtClean="0"/>
+              <a:t>record version</a:t>
+            </a:r>
+          </a:p>
+          <a:p>
+            <a:r>
+              <a:rPr lang="en-US" sz="1200" dirty="0"/>
+              <a:t>	</a:t>
+            </a:r>
+            <a:r>
+              <a:rPr lang="en-US" sz="1200" dirty="0" err="1" smtClean="0"/>
+              <a:t>filetype</a:t>
+            </a:r>
+            <a:r>
+              <a:rPr lang="en-US" sz="1200" dirty="0" smtClean="0"/>
+              <a:t> Packed/</a:t>
+            </a:r>
+            <a:r>
+              <a:rPr lang="en-US" sz="1200" dirty="0" err="1" smtClean="0"/>
+              <a:t>Uni</a:t>
+            </a:r>
+            <a:r>
+              <a:rPr lang="en-US" sz="1200" dirty="0" smtClean="0"/>
+              <a:t>/Multi/Striped</a:t>
+            </a:r>
+          </a:p>
+          <a:p>
+            <a:r>
+              <a:rPr lang="en-US" sz="1200" dirty="0"/>
+              <a:t>	</a:t>
+            </a:r>
+            <a:r>
+              <a:rPr lang="en-US" sz="1200" dirty="0" err="1" smtClean="0"/>
+              <a:t>filespac</a:t>
+            </a:r>
+            <a:r>
+              <a:rPr lang="en-US" sz="1200" dirty="0" err="1"/>
+              <a:t>e</a:t>
+            </a:r>
+            <a:r>
+              <a:rPr lang="en-US" sz="1200" dirty="0" err="1" smtClean="0"/>
+              <a:t>used</a:t>
+            </a:r>
+            <a:r>
+              <a:rPr lang="en-US" sz="1200" dirty="0" smtClean="0"/>
+              <a:t>  (for the file)</a:t>
+            </a:r>
+          </a:p>
+          <a:p>
+            <a:r>
+              <a:rPr lang="en-US" sz="1200" dirty="0"/>
+              <a:t>	</a:t>
+            </a:r>
+            <a:r>
+              <a:rPr lang="en-US" sz="1200" dirty="0" err="1" smtClean="0"/>
+              <a:t>objoffset</a:t>
+            </a:r>
+            <a:r>
+              <a:rPr lang="en-US" sz="1200" dirty="0" smtClean="0"/>
+              <a:t>  (offset of file in packed </a:t>
+            </a:r>
+            <a:r>
+              <a:rPr lang="en-US" sz="1200" dirty="0" err="1" smtClean="0"/>
+              <a:t>obj</a:t>
+            </a:r>
+            <a:r>
+              <a:rPr lang="en-US" sz="1200" dirty="0" smtClean="0"/>
               <a:t>)</a:t>
             </a:r>
           </a:p>
           <a:p>
             <a:r>
-              <a:rPr lang="en-US" dirty="0" err="1" smtClean="0"/>
-              <a:t>Objidbytes</a:t>
-            </a:r>
-            <a:r>
-              <a:rPr lang="en-US" dirty="0" smtClean="0"/>
+              <a:rPr lang="en-US" sz="1200" dirty="0"/>
+              <a:t>	</a:t>
+            </a:r>
+            <a:r>
+              <a:rPr lang="en-US" sz="1200" dirty="0" smtClean="0"/>
+              <a:t>correctness value (for the file)</a:t>
+            </a:r>
+          </a:p>
+          <a:p>
+            <a:r>
+              <a:rPr lang="en-US" sz="1200" dirty="0"/>
+              <a:t>	</a:t>
+            </a:r>
+            <a:r>
+              <a:rPr lang="en-US" sz="1200" dirty="0" err="1" smtClean="0"/>
+              <a:t>numobjects</a:t>
+            </a:r>
+            <a:r>
+              <a:rPr lang="en-US" sz="1200" dirty="0" smtClean="0"/>
+              <a:t> (number of objects</a:t>
+            </a:r>
+          </a:p>
+          <a:p>
+            <a:r>
+              <a:rPr lang="en-US" sz="1200" dirty="0"/>
+              <a:t>	</a:t>
+            </a:r>
+            <a:r>
+              <a:rPr lang="en-US" sz="1200" dirty="0" smtClean="0"/>
+              <a:t> represented in the </a:t>
+            </a:r>
+            <a:r>
+              <a:rPr lang="en-US" sz="1200" dirty="0" err="1" smtClean="0"/>
+              <a:t>mdfile</a:t>
+            </a:r>
+            <a:r>
+              <a:rPr lang="en-US" sz="1200" dirty="0" smtClean="0"/>
+              <a:t>)</a:t>
+            </a:r>
+            <a:endParaRPr lang="en-US" sz="1200" dirty="0" smtClean="0"/>
+          </a:p>
+          <a:p>
+            <a:r>
+              <a:rPr lang="en-US" dirty="0" err="1" smtClean="0"/>
+              <a:t>Objrestart</a:t>
+            </a:r>
+            <a:r>
+              <a:rPr lang="en-US" sz="1200" dirty="0"/>
               <a:t> </a:t>
             </a:r>
             <a:r>
-              <a:rPr lang="en-US" sz="1400" dirty="0" smtClean="0"/>
-              <a:t>(unique for file)</a:t>
-            </a:r>
-            <a:endParaRPr lang="en-US" sz="1400" dirty="0"/>
+              <a:rPr lang="en-US" sz="1200" dirty="0" smtClean="0"/>
+              <a:t>(present if </a:t>
+            </a:r>
+            <a:r>
+              <a:rPr lang="en-US" sz="1200" dirty="0" err="1" smtClean="0"/>
+              <a:t>pftool</a:t>
+            </a:r>
+            <a:r>
+              <a:rPr lang="en-US" sz="1200" dirty="0" smtClean="0"/>
+              <a:t> </a:t>
+            </a:r>
+            <a:r>
+              <a:rPr lang="en-US" sz="1200" dirty="0" err="1" smtClean="0"/>
+              <a:t>restartable</a:t>
+            </a:r>
+            <a:r>
+              <a:rPr lang="en-US" sz="1200" dirty="0" smtClean="0"/>
+              <a:t>)</a:t>
+            </a:r>
+            <a:endParaRPr lang="en-US" dirty="0"/>
           </a:p>
         </p:txBody>
       </p:sp>
@@ -9265,39 +9504,6 @@
           <a:xfrm flipH="1" flipV="1">
             <a:off x="4085095" y="2599895"/>
             <a:ext cx="1963988" cy="267698"/>
-          </a:xfrm>
-          <a:prstGeom prst="straightConnector1">
-            <a:avLst/>
-          </a:prstGeom>
-          <a:ln>
-            <a:tailEnd type="arrow"/>
-          </a:ln>
-        </p:spPr>
-        <p:style>
-          <a:lnRef idx="2">
-            <a:schemeClr val="accent1"/>
-          </a:lnRef>
-          <a:fillRef idx="0">
-            <a:schemeClr val="accent1"/>
-          </a:fillRef>
-          <a:effectRef idx="1">
-            <a:schemeClr val="accent1"/>
-          </a:effectRef>
-          <a:fontRef idx="minor">
-            <a:schemeClr val="tx1"/>
-          </a:fontRef>
-        </p:style>
-      </p:cxnSp>
-      <p:cxnSp>
-        <p:nvCxnSpPr>
-          <p:cNvPr id="51" name="Straight Arrow Connector 50"/>
-          <p:cNvCxnSpPr/>
-          <p:nvPr/>
-        </p:nvCxnSpPr>
-        <p:spPr>
-          <a:xfrm flipV="1">
-            <a:off x="5499166" y="4229372"/>
-            <a:ext cx="549917" cy="1985567"/>
           </a:xfrm>
           <a:prstGeom prst="straightConnector1">
             <a:avLst/>
@@ -9329,8 +9535,8 @@
         </p:nvCxnSpPr>
         <p:spPr>
           <a:xfrm>
-            <a:off x="1879600" y="2867593"/>
-            <a:ext cx="4076700" cy="1099899"/>
+            <a:off x="1879600" y="2752295"/>
+            <a:ext cx="4622800" cy="841805"/>
           </a:xfrm>
           <a:prstGeom prst="straightConnector1">
             <a:avLst/>
@@ -9499,8 +9705,8 @@
         </p:nvCxnSpPr>
         <p:spPr>
           <a:xfrm flipV="1">
-            <a:off x="1879600" y="3967492"/>
-            <a:ext cx="4076700" cy="807708"/>
+            <a:off x="1879600" y="3594100"/>
+            <a:ext cx="4622800" cy="1181100"/>
           </a:xfrm>
           <a:prstGeom prst="straightConnector1">
             <a:avLst/>
@@ -9532,8 +9738,8 @@
         </p:nvCxnSpPr>
         <p:spPr>
           <a:xfrm flipV="1">
-            <a:off x="2032000" y="3967492"/>
-            <a:ext cx="3924300" cy="1341108"/>
+            <a:off x="2032000" y="3594100"/>
+            <a:ext cx="4470400" cy="1714500"/>
           </a:xfrm>
           <a:prstGeom prst="straightConnector1">
             <a:avLst/>
@@ -10179,7 +10385,7 @@
         <p:spPr>
           <a:xfrm>
             <a:off x="2778125" y="1714459"/>
-            <a:ext cx="3111500" cy="2339102"/>
+            <a:ext cx="3111500" cy="2585323"/>
           </a:xfrm>
           <a:prstGeom prst="rect">
             <a:avLst/>
@@ -10238,27 +10444,30 @@
           <a:p>
             <a:r>
               <a:rPr lang="en-US" sz="1600" dirty="0" err="1" smtClean="0"/>
-              <a:t>Xattr</a:t>
+              <a:t>Xattr-objid</a:t>
+            </a:r>
+            <a:endParaRPr lang="en-US" sz="1600" dirty="0"/>
+          </a:p>
+          <a:p>
+            <a:r>
+              <a:rPr lang="en-US" sz="1600" dirty="0"/>
+              <a:t>r</a:t>
             </a:r>
             <a:r>
               <a:rPr lang="en-US" sz="1600" dirty="0" smtClean="0"/>
-              <a:t>-objrepo=1</a:t>
+              <a:t>epo=1   </a:t>
+            </a:r>
+          </a:p>
+          <a:p>
+            <a:r>
+              <a:rPr lang="en-US" sz="1600" dirty="0" smtClean="0"/>
+              <a:t>id=Obj001</a:t>
             </a:r>
           </a:p>
           <a:p>
             <a:r>
               <a:rPr lang="en-US" sz="1600" dirty="0" err="1" smtClean="0"/>
-              <a:t>Xattr</a:t>
-            </a:r>
-            <a:r>
-              <a:rPr lang="en-US" sz="1600" dirty="0" smtClean="0"/>
-              <a:t>-objid=Obj001</a:t>
-            </a:r>
-          </a:p>
-          <a:p>
-            <a:r>
-              <a:rPr lang="en-US" sz="1600" dirty="0" err="1" smtClean="0"/>
-              <a:t>Xattr-objoffs</a:t>
+              <a:t>objoffs</a:t>
             </a:r>
             <a:r>
               <a:rPr lang="en-US" sz="1600" dirty="0" smtClean="0"/>
@@ -10268,7 +10477,7 @@
           <a:p>
             <a:r>
               <a:rPr lang="en-US" sz="1600" dirty="0" err="1" smtClean="0"/>
-              <a:t>Xattr-objchunksize</a:t>
+              <a:t>chunksize</a:t>
             </a:r>
             <a:r>
               <a:rPr lang="en-US" sz="1600" dirty="0" smtClean="0"/>
@@ -10458,11 +10667,19 @@
             </a:r>
             <a:r>
               <a:rPr lang="en-US" sz="1600" dirty="0" smtClean="0"/>
-              <a:t>-objrepo=2, </a:t>
+              <a:t>-</a:t>
+            </a:r>
+            <a:r>
+              <a:rPr lang="en-US" sz="1600" dirty="0"/>
+              <a:t>r</a:t>
+            </a:r>
+            <a:r>
+              <a:rPr lang="en-US" sz="1600" dirty="0" smtClean="0"/>
+              <a:t>epo=2, </a:t>
             </a:r>
             <a:r>
               <a:rPr lang="en-US" sz="1600" dirty="0" err="1" smtClean="0"/>
-              <a:t>Xattr-objchunksize</a:t>
+              <a:t>chunksize</a:t>
             </a:r>
             <a:r>
               <a:rPr lang="en-US" sz="1600" dirty="0" smtClean="0"/>
@@ -10480,13 +10697,28 @@
               <a:rPr lang="en-US" sz="1600" dirty="0" smtClean="0"/>
               <a:t>,</a:t>
             </a:r>
+            <a:endParaRPr lang="en-US" sz="1600" dirty="0">
+              <a:solidFill>
+                <a:srgbClr val="FF0000"/>
+              </a:solidFill>
+            </a:endParaRPr>
+          </a:p>
+          <a:p>
+            <a:r>
+              <a:rPr lang="en-US" sz="1600" dirty="0" err="1" smtClean="0">
+                <a:solidFill>
+                  <a:srgbClr val="FF0000"/>
+                </a:solidFill>
+              </a:rPr>
+              <a:t>ojjtype</a:t>
+            </a:r>
             <a:r>
               <a:rPr lang="en-US" sz="1600" dirty="0" smtClean="0">
                 <a:solidFill>
                   <a:srgbClr val="FF0000"/>
                 </a:solidFill>
               </a:rPr>
-              <a:t>Xattr-restart=1 </a:t>
+              <a:t>-=Multi </a:t>
             </a:r>
             <a:r>
               <a:rPr lang="en-US" sz="1600" dirty="0" smtClean="0"/>
@@ -10872,7 +11104,7 @@
         <p:spPr>
           <a:xfrm>
             <a:off x="2480462" y="819188"/>
-            <a:ext cx="6580187" cy="4119984"/>
+            <a:ext cx="6580187" cy="4287320"/>
           </a:xfrm>
           <a:prstGeom prst="rect">
             <a:avLst/>
@@ -10942,7 +11174,7 @@
         <p:spPr>
           <a:xfrm flipH="1" flipV="1">
             <a:off x="889000" y="1898650"/>
-            <a:ext cx="3402012" cy="1483162"/>
+            <a:ext cx="3190874" cy="1665416"/>
           </a:xfrm>
           <a:prstGeom prst="straightConnector1">
             <a:avLst/>
@@ -10978,7 +11210,7 @@
         <p:spPr>
           <a:xfrm flipH="1" flipV="1">
             <a:off x="1041400" y="1416050"/>
-            <a:ext cx="3402012" cy="1695450"/>
+            <a:ext cx="2501900" cy="1965762"/>
           </a:xfrm>
           <a:prstGeom prst="straightConnector1">
             <a:avLst/>
@@ -11014,7 +11246,7 @@
         <p:spPr>
           <a:xfrm flipH="1" flipV="1">
             <a:off x="1190625" y="3111500"/>
-            <a:ext cx="4699000" cy="1947382"/>
+            <a:ext cx="4678362" cy="1790700"/>
           </a:xfrm>
           <a:prstGeom prst="straightConnector1">
             <a:avLst/>
@@ -11425,27 +11657,27 @@
           <a:p>
             <a:r>
               <a:rPr lang="en-US" sz="1600" dirty="0" err="1" smtClean="0"/>
-              <a:t>Xattr</a:t>
+              <a:t>Xattr_objid</a:t>
+            </a:r>
+            <a:r>
+              <a:rPr lang="en-US" sz="1600" dirty="0"/>
+              <a:t> </a:t>
             </a:r>
             <a:r>
               <a:rPr lang="en-US" sz="1600" dirty="0" smtClean="0"/>
-              <a:t>-objrepo=1</a:t>
+              <a:t>repo=1</a:t>
+            </a:r>
+          </a:p>
+          <a:p>
+            <a:r>
+              <a:rPr lang="en-US" sz="1600" dirty="0" smtClean="0"/>
+              <a:t>id=Obj001</a:t>
             </a:r>
           </a:p>
           <a:p>
             <a:r>
               <a:rPr lang="en-US" sz="1600" dirty="0" err="1" smtClean="0"/>
-              <a:t>Xattr</a:t>
-            </a:r>
-            <a:r>
-              <a:rPr lang="en-US" sz="1600" dirty="0" smtClean="0"/>
-              <a:t>-objid=Obj001</a:t>
-            </a:r>
-          </a:p>
-          <a:p>
-            <a:r>
-              <a:rPr lang="en-US" sz="1600" dirty="0" err="1" smtClean="0"/>
-              <a:t>Xattr-objoffs</a:t>
+              <a:t>objoffs</a:t>
             </a:r>
             <a:r>
               <a:rPr lang="en-US" sz="1600" dirty="0" smtClean="0"/>
@@ -11455,7 +11687,7 @@
           <a:p>
             <a:r>
               <a:rPr lang="en-US" sz="1600" dirty="0" err="1" smtClean="0"/>
-              <a:t>Xattr-objchunksize</a:t>
+              <a:t>chunksize</a:t>
             </a:r>
             <a:r>
               <a:rPr lang="en-US" sz="1600" dirty="0" smtClean="0"/>
@@ -11902,27 +12134,35 @@
           <a:p>
             <a:r>
               <a:rPr lang="en-US" sz="1600" dirty="0" err="1" smtClean="0"/>
-              <a:t>Xattr</a:t>
+              <a:t>Xattr_id</a:t>
             </a:r>
             <a:r>
               <a:rPr lang="en-US" sz="1600" dirty="0" smtClean="0"/>
-              <a:t>-objrepo=1</a:t>
-            </a:r>
-          </a:p>
-          <a:p>
+              <a:t> </a:t>
+            </a:r>
             <a:r>
               <a:rPr lang="en-US" sz="1600" dirty="0" err="1" smtClean="0"/>
-              <a:t>Xattr</a:t>
+              <a:t>jrepo</a:t>
             </a:r>
             <a:r>
               <a:rPr lang="en-US" sz="1600" dirty="0" smtClean="0"/>
-              <a:t>-objid=Obj001</a:t>
+              <a:t>=1</a:t>
+            </a:r>
+          </a:p>
+          <a:p>
+            <a:r>
+              <a:rPr lang="en-US" sz="1600" dirty="0"/>
+              <a:t>i</a:t>
+            </a:r>
+            <a:r>
+              <a:rPr lang="en-US" sz="1600" dirty="0" smtClean="0"/>
+              <a:t>d=Obj001</a:t>
             </a:r>
           </a:p>
           <a:p>
             <a:r>
               <a:rPr lang="en-US" sz="1600" dirty="0" err="1" smtClean="0"/>
-              <a:t>Xattr-objoffs</a:t>
+              <a:t>objoffs</a:t>
             </a:r>
             <a:r>
               <a:rPr lang="en-US" sz="1600" dirty="0" smtClean="0"/>
@@ -11939,8 +12179,12 @@
           </a:p>
           <a:p>
             <a:r>
+              <a:rPr lang="en-US" sz="1600" dirty="0" err="1"/>
+              <a:t>c</a:t>
+            </a:r>
+            <a:r>
               <a:rPr lang="en-US" sz="1600" dirty="0" err="1" smtClean="0"/>
-              <a:t>Xattr-objchunksize</a:t>
+              <a:t>hunksize</a:t>
             </a:r>
             <a:r>
               <a:rPr lang="en-US" sz="1600" dirty="0" smtClean="0"/>

</xml_diff>

<commit_message>
More changes by Gary and Brett
</commit_message>
<xml_diff>
--- a/Documentation/MarFS.pptx
+++ b/Documentation/MarFS.pptx
@@ -303,7 +303,7 @@
           <a:p>
             <a:fld id="{E56B258B-56D6-9F4B-8030-AEA09AD708E7}" type="datetimeFigureOut">
               <a:rPr lang="en-US" smtClean="0"/>
-              <a:t>4/3/15</a:t>
+              <a:t>4/6/15</a:t>
             </a:fld>
             <a:endParaRPr lang="en-US"/>
           </a:p>
@@ -473,7 +473,7 @@
           <a:p>
             <a:fld id="{E56B258B-56D6-9F4B-8030-AEA09AD708E7}" type="datetimeFigureOut">
               <a:rPr lang="en-US" smtClean="0"/>
-              <a:t>4/3/15</a:t>
+              <a:t>4/6/15</a:t>
             </a:fld>
             <a:endParaRPr lang="en-US"/>
           </a:p>
@@ -653,7 +653,7 @@
           <a:p>
             <a:fld id="{E56B258B-56D6-9F4B-8030-AEA09AD708E7}" type="datetimeFigureOut">
               <a:rPr lang="en-US" smtClean="0"/>
-              <a:t>4/3/15</a:t>
+              <a:t>4/6/15</a:t>
             </a:fld>
             <a:endParaRPr lang="en-US"/>
           </a:p>
@@ -823,7 +823,7 @@
           <a:p>
             <a:fld id="{E56B258B-56D6-9F4B-8030-AEA09AD708E7}" type="datetimeFigureOut">
               <a:rPr lang="en-US" smtClean="0"/>
-              <a:t>4/3/15</a:t>
+              <a:t>4/6/15</a:t>
             </a:fld>
             <a:endParaRPr lang="en-US"/>
           </a:p>
@@ -1069,7 +1069,7 @@
           <a:p>
             <a:fld id="{E56B258B-56D6-9F4B-8030-AEA09AD708E7}" type="datetimeFigureOut">
               <a:rPr lang="en-US" smtClean="0"/>
-              <a:t>4/3/15</a:t>
+              <a:t>4/6/15</a:t>
             </a:fld>
             <a:endParaRPr lang="en-US"/>
           </a:p>
@@ -1357,7 +1357,7 @@
           <a:p>
             <a:fld id="{E56B258B-56D6-9F4B-8030-AEA09AD708E7}" type="datetimeFigureOut">
               <a:rPr lang="en-US" smtClean="0"/>
-              <a:t>4/3/15</a:t>
+              <a:t>4/6/15</a:t>
             </a:fld>
             <a:endParaRPr lang="en-US"/>
           </a:p>
@@ -1779,7 +1779,7 @@
           <a:p>
             <a:fld id="{E56B258B-56D6-9F4B-8030-AEA09AD708E7}" type="datetimeFigureOut">
               <a:rPr lang="en-US" smtClean="0"/>
-              <a:t>4/3/15</a:t>
+              <a:t>4/6/15</a:t>
             </a:fld>
             <a:endParaRPr lang="en-US"/>
           </a:p>
@@ -1897,7 +1897,7 @@
           <a:p>
             <a:fld id="{E56B258B-56D6-9F4B-8030-AEA09AD708E7}" type="datetimeFigureOut">
               <a:rPr lang="en-US" smtClean="0"/>
-              <a:t>4/3/15</a:t>
+              <a:t>4/6/15</a:t>
             </a:fld>
             <a:endParaRPr lang="en-US"/>
           </a:p>
@@ -1992,7 +1992,7 @@
           <a:p>
             <a:fld id="{E56B258B-56D6-9F4B-8030-AEA09AD708E7}" type="datetimeFigureOut">
               <a:rPr lang="en-US" smtClean="0"/>
-              <a:t>4/3/15</a:t>
+              <a:t>4/6/15</a:t>
             </a:fld>
             <a:endParaRPr lang="en-US"/>
           </a:p>
@@ -2269,7 +2269,7 @@
           <a:p>
             <a:fld id="{E56B258B-56D6-9F4B-8030-AEA09AD708E7}" type="datetimeFigureOut">
               <a:rPr lang="en-US" smtClean="0"/>
-              <a:t>4/3/15</a:t>
+              <a:t>4/6/15</a:t>
             </a:fld>
             <a:endParaRPr lang="en-US"/>
           </a:p>
@@ -2522,7 +2522,7 @@
           <a:p>
             <a:fld id="{E56B258B-56D6-9F4B-8030-AEA09AD708E7}" type="datetimeFigureOut">
               <a:rPr lang="en-US" smtClean="0"/>
-              <a:t>4/3/15</a:t>
+              <a:t>4/6/15</a:t>
             </a:fld>
             <a:endParaRPr lang="en-US"/>
           </a:p>
@@ -2735,7 +2735,7 @@
           <a:p>
             <a:fld id="{E56B258B-56D6-9F4B-8030-AEA09AD708E7}" type="datetimeFigureOut">
               <a:rPr lang="en-US" smtClean="0"/>
-              <a:t>4/3/15</a:t>
+              <a:t>4/6/15</a:t>
             </a:fld>
             <a:endParaRPr lang="en-US"/>
           </a:p>
@@ -9203,8 +9203,8 @@
         </p:nvSpPr>
         <p:spPr>
           <a:xfrm>
-            <a:off x="6049083" y="1451148"/>
-            <a:ext cx="2972168" cy="4985980"/>
+            <a:off x="6049083" y="1235248"/>
+            <a:ext cx="2972168" cy="5355311"/>
           </a:xfrm>
           <a:prstGeom prst="rect">
             <a:avLst/>
@@ -9236,9 +9236,146 @@
           </a:p>
           <a:p>
             <a:r>
+              <a:rPr lang="en-US" dirty="0" smtClean="0"/>
+              <a:t>	</a:t>
+            </a:r>
+            <a:r>
+              <a:rPr lang="en-US" sz="1200" dirty="0"/>
+              <a:t>reverse order time (for sorting)</a:t>
+            </a:r>
+            <a:r>
               <a:rPr lang="en-US" dirty="0"/>
               <a:t>	</a:t>
             </a:r>
+            <a:endParaRPr lang="en-US" dirty="0" smtClean="0"/>
+          </a:p>
+          <a:p>
+            <a:r>
+              <a:rPr lang="en-US" sz="1200" dirty="0" smtClean="0"/>
+              <a:t>	record </a:t>
+            </a:r>
+            <a:r>
+              <a:rPr lang="en-US" sz="1200" dirty="0" smtClean="0"/>
+              <a:t>version</a:t>
+            </a:r>
+          </a:p>
+          <a:p>
+            <a:r>
+              <a:rPr lang="en-US" sz="1200" dirty="0"/>
+              <a:t>	</a:t>
+            </a:r>
+            <a:r>
+              <a:rPr lang="en-US" sz="1200" dirty="0" err="1" smtClean="0"/>
+              <a:t>mdfile</a:t>
+            </a:r>
+            <a:r>
+              <a:rPr lang="en-US" sz="1200" dirty="0" smtClean="0"/>
+              <a:t> create </a:t>
+            </a:r>
+            <a:r>
+              <a:rPr lang="en-US" sz="1200" dirty="0" smtClean="0"/>
+              <a:t>time</a:t>
+            </a:r>
+          </a:p>
+          <a:p>
+            <a:r>
+              <a:rPr lang="en-US" sz="1200" dirty="0"/>
+              <a:t>	</a:t>
+            </a:r>
+            <a:r>
+              <a:rPr lang="en-US" sz="1200" dirty="0" smtClean="0"/>
+              <a:t>object creation time</a:t>
+            </a:r>
+            <a:endParaRPr lang="en-US" sz="1200" dirty="0"/>
+          </a:p>
+          <a:p>
+            <a:r>
+              <a:rPr lang="en-US" sz="1200" dirty="0"/>
+              <a:t>	</a:t>
+            </a:r>
+            <a:r>
+              <a:rPr lang="en-US" sz="1200" dirty="0" smtClean="0"/>
+              <a:t>Object Packed or Not</a:t>
+            </a:r>
+          </a:p>
+          <a:p>
+            <a:r>
+              <a:rPr lang="en-US" sz="1200" dirty="0"/>
+              <a:t>	</a:t>
+            </a:r>
+            <a:r>
+              <a:rPr lang="en-US" sz="1200" dirty="0" err="1" smtClean="0"/>
+              <a:t>comptype</a:t>
+            </a:r>
+            <a:endParaRPr lang="en-US" sz="1200" dirty="0" smtClean="0"/>
+          </a:p>
+          <a:p>
+            <a:r>
+              <a:rPr lang="en-US" sz="1200" dirty="0"/>
+              <a:t>	</a:t>
+            </a:r>
+            <a:r>
+              <a:rPr lang="en-US" sz="1200" dirty="0" err="1" smtClean="0"/>
+              <a:t>securitytype</a:t>
+            </a:r>
+            <a:endParaRPr lang="en-US" sz="1200" dirty="0" smtClean="0"/>
+          </a:p>
+          <a:p>
+            <a:r>
+              <a:rPr lang="en-US" sz="1200" dirty="0"/>
+              <a:t>	</a:t>
+            </a:r>
+            <a:r>
+              <a:rPr lang="en-US" sz="1200" dirty="0" err="1" smtClean="0"/>
+              <a:t>correctnesstype</a:t>
+            </a:r>
+            <a:endParaRPr lang="en-US" sz="1200" dirty="0" smtClean="0"/>
+          </a:p>
+          <a:p>
+            <a:r>
+              <a:rPr lang="en-US" sz="1200" dirty="0"/>
+              <a:t>	</a:t>
+            </a:r>
+            <a:r>
+              <a:rPr lang="en-US" sz="1200" dirty="0" err="1" smtClean="0"/>
+              <a:t>chunksize</a:t>
+            </a:r>
+            <a:endParaRPr lang="en-US" sz="1200" dirty="0" smtClean="0"/>
+          </a:p>
+          <a:p>
+            <a:r>
+              <a:rPr lang="en-US" sz="1200" dirty="0"/>
+              <a:t>	</a:t>
+            </a:r>
+            <a:r>
+              <a:rPr lang="en-US" sz="1200" dirty="0" err="1" smtClean="0"/>
+              <a:t>chunknumber</a:t>
+            </a:r>
+            <a:endParaRPr lang="en-US" sz="1200" dirty="0" smtClean="0"/>
+          </a:p>
+          <a:p>
+            <a:r>
+              <a:rPr lang="en-US" sz="1200" dirty="0"/>
+              <a:t>	</a:t>
+            </a:r>
+            <a:r>
+              <a:rPr lang="en-US" sz="1200" dirty="0" err="1" smtClean="0"/>
+              <a:t>mdfileinode</a:t>
+            </a:r>
+            <a:endParaRPr lang="en-US" sz="1200" dirty="0" smtClean="0"/>
+          </a:p>
+          <a:p>
+            <a:r>
+              <a:rPr lang="en-US" dirty="0" err="1" smtClean="0"/>
+              <a:t>Objpost</a:t>
+            </a:r>
+            <a:endParaRPr lang="en-US" dirty="0" smtClean="0"/>
+          </a:p>
+          <a:p>
+            <a:r>
+              <a:rPr lang="en-US" dirty="0"/>
+              <a:t>	</a:t>
+            </a:r>
             <a:r>
               <a:rPr lang="en-US" sz="1200" dirty="0" smtClean="0"/>
               <a:t>record version</a:t>
@@ -9251,13 +9388,20 @@
             </a:r>
             <a:r>
               <a:rPr lang="en-US" sz="1200" dirty="0" err="1" smtClean="0"/>
-              <a:t>mdfile</a:t>
+              <a:t>filetype</a:t>
             </a:r>
             <a:r>
               <a:rPr lang="en-US" sz="1200" dirty="0" smtClean="0"/>
-              <a:t> create time</a:t>
-            </a:r>
-            <a:endParaRPr lang="en-US" sz="1200" dirty="0"/>
+              <a:t> Packed/</a:t>
+            </a:r>
+            <a:r>
+              <a:rPr lang="en-US" sz="1200" dirty="0" err="1" smtClean="0"/>
+              <a:t>Uni</a:t>
+            </a:r>
+            <a:r>
+              <a:rPr lang="en-US" sz="1200" dirty="0" smtClean="0"/>
+              <a:t>/Multi/Striped</a:t>
+            </a:r>
           </a:p>
           <a:p>
             <a:r>
@@ -9265,8 +9409,20 @@
               <a:t>	</a:t>
             </a:r>
             <a:r>
+              <a:rPr lang="en-US" sz="1200" dirty="0" err="1" smtClean="0"/>
+              <a:t>filespac</a:t>
+            </a:r>
+            <a:r>
+              <a:rPr lang="en-US" sz="1200" dirty="0" err="1"/>
+              <a:t>e</a:t>
+            </a:r>
+            <a:r>
+              <a:rPr lang="en-US" sz="1200" dirty="0" err="1" smtClean="0"/>
+              <a:t>used</a:t>
+            </a:r>
+            <a:r>
               <a:rPr lang="en-US" sz="1200" dirty="0" smtClean="0"/>
-              <a:t>Object Packed or Not</a:t>
+              <a:t>  (for the file)</a:t>
             </a:r>
           </a:p>
           <a:p>
@@ -9276,9 +9432,20 @@
             </a:r>
             <a:r>
               <a:rPr lang="en-US" sz="1200" dirty="0" err="1" smtClean="0"/>
-              <a:t>comptype</a:t>
-            </a:r>
-            <a:endParaRPr lang="en-US" sz="1200" dirty="0" smtClean="0"/>
+              <a:t>objoffset</a:t>
+            </a:r>
+            <a:r>
+              <a:rPr lang="en-US" sz="1200" dirty="0" smtClean="0"/>
+              <a:t>  (offset of file in packed </a:t>
+            </a:r>
+            <a:r>
+              <a:rPr lang="en-US" sz="1200" dirty="0" err="1" smtClean="0"/>
+              <a:t>obj</a:t>
+            </a:r>
+            <a:r>
+              <a:rPr lang="en-US" sz="1200" dirty="0" smtClean="0"/>
+              <a:t>)</a:t>
+            </a:r>
           </a:p>
           <a:p>
             <a:r>
@@ -9286,10 +9453,9 @@
               <a:t>	</a:t>
             </a:r>
             <a:r>
-              <a:rPr lang="en-US" sz="1200" dirty="0" err="1" smtClean="0"/>
-              <a:t>securitytype</a:t>
-            </a:r>
-            <a:endParaRPr lang="en-US" sz="1200" dirty="0" smtClean="0"/>
+              <a:rPr lang="en-US" sz="1200" dirty="0" smtClean="0"/>
+              <a:t>correctness value (for the file)</a:t>
+            </a:r>
           </a:p>
           <a:p>
             <a:r>
@@ -9298,9 +9464,12 @@
             </a:r>
             <a:r>
               <a:rPr lang="en-US" sz="1200" dirty="0" err="1" smtClean="0"/>
-              <a:t>correctnesstype</a:t>
-            </a:r>
-            <a:endParaRPr lang="en-US" sz="1200" dirty="0" smtClean="0"/>
+              <a:t>numobjects</a:t>
+            </a:r>
+            <a:r>
+              <a:rPr lang="en-US" sz="1200" dirty="0" smtClean="0"/>
+              <a:t> (number of objects</a:t>
+            </a:r>
           </a:p>
           <a:p>
             <a:r>
@@ -9308,10 +9477,17 @@
               <a:t>	</a:t>
             </a:r>
             <a:r>
+              <a:rPr lang="en-US" sz="1200" dirty="0" smtClean="0"/>
+              <a:t> represented in the </a:t>
+            </a:r>
+            <a:r>
               <a:rPr lang="en-US" sz="1200" dirty="0" err="1" smtClean="0"/>
-              <a:t>chunksize</a:t>
-            </a:r>
-            <a:endParaRPr lang="en-US" sz="1200" dirty="0" smtClean="0"/>
+              <a:t>mdfile</a:t>
+            </a:r>
+            <a:r>
+              <a:rPr lang="en-US" sz="1200" dirty="0" smtClean="0"/>
+              <a:t>)</a:t>
+            </a:r>
           </a:p>
           <a:p>
             <a:r>
@@ -9320,160 +9496,12 @@
             </a:r>
             <a:r>
               <a:rPr lang="en-US" sz="1200" dirty="0" err="1" smtClean="0"/>
-              <a:t>chunknumber</a:t>
-            </a:r>
-            <a:endParaRPr lang="en-US" sz="1200" dirty="0" smtClean="0"/>
-          </a:p>
-          <a:p>
-            <a:r>
-              <a:rPr lang="en-US" sz="1200" dirty="0"/>
-              <a:t>	</a:t>
-            </a:r>
-            <a:r>
-              <a:rPr lang="en-US" sz="1200" dirty="0" err="1" smtClean="0"/>
-              <a:t>mdfileinode</a:t>
-            </a:r>
-            <a:endParaRPr lang="en-US" sz="1200" dirty="0" smtClean="0"/>
-          </a:p>
-          <a:p>
-            <a:r>
-              <a:rPr lang="en-US" dirty="0" err="1" smtClean="0"/>
-              <a:t>Objpost</a:t>
-            </a:r>
-            <a:endParaRPr lang="en-US" dirty="0" smtClean="0"/>
-          </a:p>
-          <a:p>
-            <a:r>
-              <a:rPr lang="en-US" dirty="0"/>
-              <a:t>	</a:t>
-            </a:r>
-            <a:r>
-              <a:rPr lang="en-US" sz="1200" dirty="0" smtClean="0"/>
-              <a:t>record version</a:t>
-            </a:r>
-          </a:p>
-          <a:p>
-            <a:r>
-              <a:rPr lang="en-US" sz="1200" dirty="0"/>
-              <a:t>	</a:t>
-            </a:r>
-            <a:r>
-              <a:rPr lang="en-US" sz="1200" dirty="0" err="1" smtClean="0"/>
-              <a:t>filetype</a:t>
-            </a:r>
-            <a:r>
-              <a:rPr lang="en-US" sz="1200" dirty="0" smtClean="0"/>
-              <a:t> Packed/</a:t>
-            </a:r>
-            <a:r>
-              <a:rPr lang="en-US" sz="1200" dirty="0" err="1" smtClean="0"/>
-              <a:t>Uni</a:t>
-            </a:r>
-            <a:r>
-              <a:rPr lang="en-US" sz="1200" dirty="0" smtClean="0"/>
-              <a:t>/Multi/Striped</a:t>
-            </a:r>
-          </a:p>
-          <a:p>
-            <a:r>
-              <a:rPr lang="en-US" sz="1200" dirty="0"/>
-              <a:t>	</a:t>
-            </a:r>
-            <a:r>
-              <a:rPr lang="en-US" sz="1200" dirty="0" err="1" smtClean="0"/>
-              <a:t>filespac</a:t>
-            </a:r>
-            <a:r>
-              <a:rPr lang="en-US" sz="1200" dirty="0" err="1"/>
-              <a:t>e</a:t>
-            </a:r>
-            <a:r>
-              <a:rPr lang="en-US" sz="1200" dirty="0" err="1" smtClean="0"/>
-              <a:t>used</a:t>
-            </a:r>
-            <a:r>
-              <a:rPr lang="en-US" sz="1200" dirty="0" smtClean="0"/>
-              <a:t>  (for the file)</a:t>
-            </a:r>
-          </a:p>
-          <a:p>
-            <a:r>
-              <a:rPr lang="en-US" sz="1200" dirty="0"/>
-              <a:t>	</a:t>
-            </a:r>
-            <a:r>
-              <a:rPr lang="en-US" sz="1200" dirty="0" err="1" smtClean="0"/>
-              <a:t>objoffset</a:t>
-            </a:r>
-            <a:r>
-              <a:rPr lang="en-US" sz="1200" dirty="0" smtClean="0"/>
-              <a:t>  (offset of file in packed </a:t>
-            </a:r>
-            <a:r>
-              <a:rPr lang="en-US" sz="1200" dirty="0" err="1" smtClean="0"/>
-              <a:t>obj</a:t>
-            </a:r>
-            <a:r>
-              <a:rPr lang="en-US" sz="1200" dirty="0" smtClean="0"/>
-              <a:t>)</a:t>
-            </a:r>
-          </a:p>
-          <a:p>
-            <a:r>
-              <a:rPr lang="en-US" sz="1200" dirty="0"/>
-              <a:t>	</a:t>
-            </a:r>
-            <a:r>
-              <a:rPr lang="en-US" sz="1200" dirty="0" smtClean="0"/>
-              <a:t>correctness value (for the file)</a:t>
-            </a:r>
-          </a:p>
-          <a:p>
-            <a:r>
-              <a:rPr lang="en-US" sz="1200" dirty="0"/>
-              <a:t>	</a:t>
-            </a:r>
-            <a:r>
-              <a:rPr lang="en-US" sz="1200" dirty="0" err="1" smtClean="0"/>
-              <a:t>numobjects</a:t>
-            </a:r>
-            <a:r>
-              <a:rPr lang="en-US" sz="1200" dirty="0" smtClean="0"/>
-              <a:t> (number of objects</a:t>
-            </a:r>
-          </a:p>
-          <a:p>
-            <a:r>
-              <a:rPr lang="en-US" sz="1200" dirty="0"/>
-              <a:t>	</a:t>
-            </a:r>
-            <a:r>
-              <a:rPr lang="en-US" sz="1200" dirty="0" smtClean="0"/>
-              <a:t> represented in the </a:t>
-            </a:r>
-            <a:r>
-              <a:rPr lang="en-US" sz="1200" dirty="0" err="1" smtClean="0"/>
-              <a:t>mdfile</a:t>
-            </a:r>
-            <a:r>
-              <a:rPr lang="en-US" sz="1200" dirty="0" smtClean="0"/>
-              <a:t>)</a:t>
-            </a:r>
-          </a:p>
-          <a:p>
-            <a:r>
-              <a:rPr lang="en-US" sz="1200" dirty="0"/>
-              <a:t>	</a:t>
-            </a:r>
-            <a:r>
-              <a:rPr lang="en-US" sz="1200" dirty="0" err="1" smtClean="0"/>
               <a:t>chunkinfobytes</a:t>
             </a:r>
             <a:r>
               <a:rPr lang="en-US" sz="1200" dirty="0" smtClean="0"/>
               <a:t> (bytes of real chunk 	info in the file</a:t>
             </a:r>
-            <a:endParaRPr lang="en-US" sz="1200" dirty="0" smtClean="0"/>
           </a:p>
           <a:p>
             <a:r>

</xml_diff>

<commit_message>
Changes by Gary and Jeff -- objid "struct" includes bucket-name.
</commit_message>
<xml_diff>
--- a/Documentation/MarFS.pptx
+++ b/Documentation/MarFS.pptx
@@ -303,7 +303,8 @@
           <a:p>
             <a:fld id="{E56B258B-56D6-9F4B-8030-AEA09AD708E7}" type="datetimeFigureOut">
               <a:rPr lang="en-US" smtClean="0"/>
-              <a:t>4/6/15</a:t>
+              <a:pPr/>
+              <a:t>4/10/2015</a:t>
             </a:fld>
             <a:endParaRPr lang="en-US"/>
           </a:p>
@@ -345,6 +346,7 @@
           <a:p>
             <a:fld id="{4D86E7F8-8F53-4D47-99DB-03F948D1FD85}" type="slidenum">
               <a:rPr lang="en-US" smtClean="0"/>
+              <a:pPr/>
               <a:t>‹#›</a:t>
             </a:fld>
             <a:endParaRPr lang="en-US"/>
@@ -354,7 +356,7 @@
     </p:spTree>
     <p:extLst>
       <p:ext uri="{BB962C8B-B14F-4D97-AF65-F5344CB8AC3E}">
-        <p14:creationId xmlns:p14="http://schemas.microsoft.com/office/powerpoint/2010/main" val="1444343574"/>
+        <p14:creationId xmlns:p14="http://schemas.microsoft.com/office/powerpoint/2010/main" xmlns="" val="1444343574"/>
       </p:ext>
     </p:extLst>
   </p:cSld>
@@ -473,7 +475,8 @@
           <a:p>
             <a:fld id="{E56B258B-56D6-9F4B-8030-AEA09AD708E7}" type="datetimeFigureOut">
               <a:rPr lang="en-US" smtClean="0"/>
-              <a:t>4/6/15</a:t>
+              <a:pPr/>
+              <a:t>4/10/2015</a:t>
             </a:fld>
             <a:endParaRPr lang="en-US"/>
           </a:p>
@@ -515,6 +518,7 @@
           <a:p>
             <a:fld id="{4D86E7F8-8F53-4D47-99DB-03F948D1FD85}" type="slidenum">
               <a:rPr lang="en-US" smtClean="0"/>
+              <a:pPr/>
               <a:t>‹#›</a:t>
             </a:fld>
             <a:endParaRPr lang="en-US"/>
@@ -524,7 +528,7 @@
     </p:spTree>
     <p:extLst>
       <p:ext uri="{BB962C8B-B14F-4D97-AF65-F5344CB8AC3E}">
-        <p14:creationId xmlns:p14="http://schemas.microsoft.com/office/powerpoint/2010/main" val="2250657107"/>
+        <p14:creationId xmlns:p14="http://schemas.microsoft.com/office/powerpoint/2010/main" xmlns="" val="2250657107"/>
       </p:ext>
     </p:extLst>
   </p:cSld>
@@ -653,7 +657,8 @@
           <a:p>
             <a:fld id="{E56B258B-56D6-9F4B-8030-AEA09AD708E7}" type="datetimeFigureOut">
               <a:rPr lang="en-US" smtClean="0"/>
-              <a:t>4/6/15</a:t>
+              <a:pPr/>
+              <a:t>4/10/2015</a:t>
             </a:fld>
             <a:endParaRPr lang="en-US"/>
           </a:p>
@@ -695,6 +700,7 @@
           <a:p>
             <a:fld id="{4D86E7F8-8F53-4D47-99DB-03F948D1FD85}" type="slidenum">
               <a:rPr lang="en-US" smtClean="0"/>
+              <a:pPr/>
               <a:t>‹#›</a:t>
             </a:fld>
             <a:endParaRPr lang="en-US"/>
@@ -704,7 +710,7 @@
     </p:spTree>
     <p:extLst>
       <p:ext uri="{BB962C8B-B14F-4D97-AF65-F5344CB8AC3E}">
-        <p14:creationId xmlns:p14="http://schemas.microsoft.com/office/powerpoint/2010/main" val="4180049957"/>
+        <p14:creationId xmlns:p14="http://schemas.microsoft.com/office/powerpoint/2010/main" xmlns="" val="4180049957"/>
       </p:ext>
     </p:extLst>
   </p:cSld>
@@ -823,7 +829,8 @@
           <a:p>
             <a:fld id="{E56B258B-56D6-9F4B-8030-AEA09AD708E7}" type="datetimeFigureOut">
               <a:rPr lang="en-US" smtClean="0"/>
-              <a:t>4/6/15</a:t>
+              <a:pPr/>
+              <a:t>4/10/2015</a:t>
             </a:fld>
             <a:endParaRPr lang="en-US"/>
           </a:p>
@@ -865,6 +872,7 @@
           <a:p>
             <a:fld id="{4D86E7F8-8F53-4D47-99DB-03F948D1FD85}" type="slidenum">
               <a:rPr lang="en-US" smtClean="0"/>
+              <a:pPr/>
               <a:t>‹#›</a:t>
             </a:fld>
             <a:endParaRPr lang="en-US"/>
@@ -874,7 +882,7 @@
     </p:spTree>
     <p:extLst>
       <p:ext uri="{BB962C8B-B14F-4D97-AF65-F5344CB8AC3E}">
-        <p14:creationId xmlns:p14="http://schemas.microsoft.com/office/powerpoint/2010/main" val="627542816"/>
+        <p14:creationId xmlns:p14="http://schemas.microsoft.com/office/powerpoint/2010/main" xmlns="" val="627542816"/>
       </p:ext>
     </p:extLst>
   </p:cSld>
@@ -1069,7 +1077,8 @@
           <a:p>
             <a:fld id="{E56B258B-56D6-9F4B-8030-AEA09AD708E7}" type="datetimeFigureOut">
               <a:rPr lang="en-US" smtClean="0"/>
-              <a:t>4/6/15</a:t>
+              <a:pPr/>
+              <a:t>4/10/2015</a:t>
             </a:fld>
             <a:endParaRPr lang="en-US"/>
           </a:p>
@@ -1111,6 +1120,7 @@
           <a:p>
             <a:fld id="{4D86E7F8-8F53-4D47-99DB-03F948D1FD85}" type="slidenum">
               <a:rPr lang="en-US" smtClean="0"/>
+              <a:pPr/>
               <a:t>‹#›</a:t>
             </a:fld>
             <a:endParaRPr lang="en-US"/>
@@ -1120,7 +1130,7 @@
     </p:spTree>
     <p:extLst>
       <p:ext uri="{BB962C8B-B14F-4D97-AF65-F5344CB8AC3E}">
-        <p14:creationId xmlns:p14="http://schemas.microsoft.com/office/powerpoint/2010/main" val="3477212502"/>
+        <p14:creationId xmlns:p14="http://schemas.microsoft.com/office/powerpoint/2010/main" xmlns="" val="3477212502"/>
       </p:ext>
     </p:extLst>
   </p:cSld>
@@ -1357,7 +1367,8 @@
           <a:p>
             <a:fld id="{E56B258B-56D6-9F4B-8030-AEA09AD708E7}" type="datetimeFigureOut">
               <a:rPr lang="en-US" smtClean="0"/>
-              <a:t>4/6/15</a:t>
+              <a:pPr/>
+              <a:t>4/10/2015</a:t>
             </a:fld>
             <a:endParaRPr lang="en-US"/>
           </a:p>
@@ -1399,6 +1410,7 @@
           <a:p>
             <a:fld id="{4D86E7F8-8F53-4D47-99DB-03F948D1FD85}" type="slidenum">
               <a:rPr lang="en-US" smtClean="0"/>
+              <a:pPr/>
               <a:t>‹#›</a:t>
             </a:fld>
             <a:endParaRPr lang="en-US"/>
@@ -1408,7 +1420,7 @@
     </p:spTree>
     <p:extLst>
       <p:ext uri="{BB962C8B-B14F-4D97-AF65-F5344CB8AC3E}">
-        <p14:creationId xmlns:p14="http://schemas.microsoft.com/office/powerpoint/2010/main" val="1332698112"/>
+        <p14:creationId xmlns:p14="http://schemas.microsoft.com/office/powerpoint/2010/main" xmlns="" val="1332698112"/>
       </p:ext>
     </p:extLst>
   </p:cSld>
@@ -1779,7 +1791,8 @@
           <a:p>
             <a:fld id="{E56B258B-56D6-9F4B-8030-AEA09AD708E7}" type="datetimeFigureOut">
               <a:rPr lang="en-US" smtClean="0"/>
-              <a:t>4/6/15</a:t>
+              <a:pPr/>
+              <a:t>4/10/2015</a:t>
             </a:fld>
             <a:endParaRPr lang="en-US"/>
           </a:p>
@@ -1821,6 +1834,7 @@
           <a:p>
             <a:fld id="{4D86E7F8-8F53-4D47-99DB-03F948D1FD85}" type="slidenum">
               <a:rPr lang="en-US" smtClean="0"/>
+              <a:pPr/>
               <a:t>‹#›</a:t>
             </a:fld>
             <a:endParaRPr lang="en-US"/>
@@ -1830,7 +1844,7 @@
     </p:spTree>
     <p:extLst>
       <p:ext uri="{BB962C8B-B14F-4D97-AF65-F5344CB8AC3E}">
-        <p14:creationId xmlns:p14="http://schemas.microsoft.com/office/powerpoint/2010/main" val="1561734272"/>
+        <p14:creationId xmlns:p14="http://schemas.microsoft.com/office/powerpoint/2010/main" xmlns="" val="1561734272"/>
       </p:ext>
     </p:extLst>
   </p:cSld>
@@ -1897,7 +1911,8 @@
           <a:p>
             <a:fld id="{E56B258B-56D6-9F4B-8030-AEA09AD708E7}" type="datetimeFigureOut">
               <a:rPr lang="en-US" smtClean="0"/>
-              <a:t>4/6/15</a:t>
+              <a:pPr/>
+              <a:t>4/10/2015</a:t>
             </a:fld>
             <a:endParaRPr lang="en-US"/>
           </a:p>
@@ -1939,6 +1954,7 @@
           <a:p>
             <a:fld id="{4D86E7F8-8F53-4D47-99DB-03F948D1FD85}" type="slidenum">
               <a:rPr lang="en-US" smtClean="0"/>
+              <a:pPr/>
               <a:t>‹#›</a:t>
             </a:fld>
             <a:endParaRPr lang="en-US"/>
@@ -1948,7 +1964,7 @@
     </p:spTree>
     <p:extLst>
       <p:ext uri="{BB962C8B-B14F-4D97-AF65-F5344CB8AC3E}">
-        <p14:creationId xmlns:p14="http://schemas.microsoft.com/office/powerpoint/2010/main" val="3427251546"/>
+        <p14:creationId xmlns:p14="http://schemas.microsoft.com/office/powerpoint/2010/main" xmlns="" val="3427251546"/>
       </p:ext>
     </p:extLst>
   </p:cSld>
@@ -1992,7 +2008,8 @@
           <a:p>
             <a:fld id="{E56B258B-56D6-9F4B-8030-AEA09AD708E7}" type="datetimeFigureOut">
               <a:rPr lang="en-US" smtClean="0"/>
-              <a:t>4/6/15</a:t>
+              <a:pPr/>
+              <a:t>4/10/2015</a:t>
             </a:fld>
             <a:endParaRPr lang="en-US"/>
           </a:p>
@@ -2034,6 +2051,7 @@
           <a:p>
             <a:fld id="{4D86E7F8-8F53-4D47-99DB-03F948D1FD85}" type="slidenum">
               <a:rPr lang="en-US" smtClean="0"/>
+              <a:pPr/>
               <a:t>‹#›</a:t>
             </a:fld>
             <a:endParaRPr lang="en-US"/>
@@ -2043,7 +2061,7 @@
     </p:spTree>
     <p:extLst>
       <p:ext uri="{BB962C8B-B14F-4D97-AF65-F5344CB8AC3E}">
-        <p14:creationId xmlns:p14="http://schemas.microsoft.com/office/powerpoint/2010/main" val="691797298"/>
+        <p14:creationId xmlns:p14="http://schemas.microsoft.com/office/powerpoint/2010/main" xmlns="" val="691797298"/>
       </p:ext>
     </p:extLst>
   </p:cSld>
@@ -2269,7 +2287,8 @@
           <a:p>
             <a:fld id="{E56B258B-56D6-9F4B-8030-AEA09AD708E7}" type="datetimeFigureOut">
               <a:rPr lang="en-US" smtClean="0"/>
-              <a:t>4/6/15</a:t>
+              <a:pPr/>
+              <a:t>4/10/2015</a:t>
             </a:fld>
             <a:endParaRPr lang="en-US"/>
           </a:p>
@@ -2311,6 +2330,7 @@
           <a:p>
             <a:fld id="{4D86E7F8-8F53-4D47-99DB-03F948D1FD85}" type="slidenum">
               <a:rPr lang="en-US" smtClean="0"/>
+              <a:pPr/>
               <a:t>‹#›</a:t>
             </a:fld>
             <a:endParaRPr lang="en-US"/>
@@ -2320,7 +2340,7 @@
     </p:spTree>
     <p:extLst>
       <p:ext uri="{BB962C8B-B14F-4D97-AF65-F5344CB8AC3E}">
-        <p14:creationId xmlns:p14="http://schemas.microsoft.com/office/powerpoint/2010/main" val="699764503"/>
+        <p14:creationId xmlns:p14="http://schemas.microsoft.com/office/powerpoint/2010/main" xmlns="" val="699764503"/>
       </p:ext>
     </p:extLst>
   </p:cSld>
@@ -2522,7 +2542,8 @@
           <a:p>
             <a:fld id="{E56B258B-56D6-9F4B-8030-AEA09AD708E7}" type="datetimeFigureOut">
               <a:rPr lang="en-US" smtClean="0"/>
-              <a:t>4/6/15</a:t>
+              <a:pPr/>
+              <a:t>4/10/2015</a:t>
             </a:fld>
             <a:endParaRPr lang="en-US"/>
           </a:p>
@@ -2564,6 +2585,7 @@
           <a:p>
             <a:fld id="{4D86E7F8-8F53-4D47-99DB-03F948D1FD85}" type="slidenum">
               <a:rPr lang="en-US" smtClean="0"/>
+              <a:pPr/>
               <a:t>‹#›</a:t>
             </a:fld>
             <a:endParaRPr lang="en-US"/>
@@ -2573,7 +2595,7 @@
     </p:spTree>
     <p:extLst>
       <p:ext uri="{BB962C8B-B14F-4D97-AF65-F5344CB8AC3E}">
-        <p14:creationId xmlns:p14="http://schemas.microsoft.com/office/powerpoint/2010/main" val="1342638872"/>
+        <p14:creationId xmlns:p14="http://schemas.microsoft.com/office/powerpoint/2010/main" xmlns="" val="1342638872"/>
       </p:ext>
     </p:extLst>
   </p:cSld>
@@ -2735,7 +2757,8 @@
           <a:p>
             <a:fld id="{E56B258B-56D6-9F4B-8030-AEA09AD708E7}" type="datetimeFigureOut">
               <a:rPr lang="en-US" smtClean="0"/>
-              <a:t>4/6/15</a:t>
+              <a:pPr/>
+              <a:t>4/10/2015</a:t>
             </a:fld>
             <a:endParaRPr lang="en-US"/>
           </a:p>
@@ -2813,6 +2836,7 @@
           <a:p>
             <a:fld id="{4D86E7F8-8F53-4D47-99DB-03F948D1FD85}" type="slidenum">
               <a:rPr lang="en-US" smtClean="0"/>
+              <a:pPr/>
               <a:t>‹#›</a:t>
             </a:fld>
             <a:endParaRPr lang="en-US"/>
@@ -2822,7 +2846,7 @@
     </p:spTree>
     <p:extLst>
       <p:ext uri="{BB962C8B-B14F-4D97-AF65-F5344CB8AC3E}">
-        <p14:creationId xmlns:p14="http://schemas.microsoft.com/office/powerpoint/2010/main" val="3309622001"/>
+        <p14:creationId xmlns:p14="http://schemas.microsoft.com/office/powerpoint/2010/main" xmlns="" val="3309622001"/>
       </p:ext>
     </p:extLst>
   </p:cSld>
@@ -3159,7 +3183,7 @@
     </p:spTree>
     <p:extLst>
       <p:ext uri="{BB962C8B-B14F-4D97-AF65-F5344CB8AC3E}">
-        <p14:creationId xmlns:p14="http://schemas.microsoft.com/office/powerpoint/2010/main" val="3647797614"/>
+        <p14:creationId xmlns:p14="http://schemas.microsoft.com/office/powerpoint/2010/main" xmlns="" val="3647797614"/>
       </p:ext>
     </p:extLst>
   </p:cSld>
@@ -3331,7 +3355,7 @@
     </p:spTree>
     <p:extLst>
       <p:ext uri="{BB962C8B-B14F-4D97-AF65-F5344CB8AC3E}">
-        <p14:creationId xmlns:p14="http://schemas.microsoft.com/office/powerpoint/2010/main" val="681542384"/>
+        <p14:creationId xmlns:p14="http://schemas.microsoft.com/office/powerpoint/2010/main" xmlns="" val="681542384"/>
       </p:ext>
     </p:extLst>
   </p:cSld>
@@ -3455,7 +3479,7 @@
     </p:spTree>
     <p:extLst>
       <p:ext uri="{BB962C8B-B14F-4D97-AF65-F5344CB8AC3E}">
-        <p14:creationId xmlns:p14="http://schemas.microsoft.com/office/powerpoint/2010/main" val="848222375"/>
+        <p14:creationId xmlns:p14="http://schemas.microsoft.com/office/powerpoint/2010/main" xmlns="" val="848222375"/>
       </p:ext>
     </p:extLst>
   </p:cSld>
@@ -3731,7 +3755,7 @@
     </p:spTree>
     <p:extLst>
       <p:ext uri="{BB962C8B-B14F-4D97-AF65-F5344CB8AC3E}">
-        <p14:creationId xmlns:p14="http://schemas.microsoft.com/office/powerpoint/2010/main" val="2262753033"/>
+        <p14:creationId xmlns:p14="http://schemas.microsoft.com/office/powerpoint/2010/main" xmlns="" val="2262753033"/>
       </p:ext>
     </p:extLst>
   </p:cSld>
@@ -3964,7 +3988,7 @@
     </p:spTree>
     <p:extLst>
       <p:ext uri="{BB962C8B-B14F-4D97-AF65-F5344CB8AC3E}">
-        <p14:creationId xmlns:p14="http://schemas.microsoft.com/office/powerpoint/2010/main" val="2547314434"/>
+        <p14:creationId xmlns:p14="http://schemas.microsoft.com/office/powerpoint/2010/main" xmlns="" val="2547314434"/>
       </p:ext>
     </p:extLst>
   </p:cSld>
@@ -4227,7 +4251,7 @@
     </p:spTree>
     <p:extLst>
       <p:ext uri="{BB962C8B-B14F-4D97-AF65-F5344CB8AC3E}">
-        <p14:creationId xmlns:p14="http://schemas.microsoft.com/office/powerpoint/2010/main" val="121157684"/>
+        <p14:creationId xmlns:p14="http://schemas.microsoft.com/office/powerpoint/2010/main" xmlns="" val="121157684"/>
       </p:ext>
     </p:extLst>
   </p:cSld>
@@ -4374,7 +4398,7 @@
     </p:spTree>
     <p:extLst>
       <p:ext uri="{BB962C8B-B14F-4D97-AF65-F5344CB8AC3E}">
-        <p14:creationId xmlns:p14="http://schemas.microsoft.com/office/powerpoint/2010/main" val="2086497316"/>
+        <p14:creationId xmlns:p14="http://schemas.microsoft.com/office/powerpoint/2010/main" xmlns="" val="2086497316"/>
       </p:ext>
     </p:extLst>
   </p:cSld>
@@ -4546,7 +4570,7 @@
     </p:spTree>
     <p:extLst>
       <p:ext uri="{BB962C8B-B14F-4D97-AF65-F5344CB8AC3E}">
-        <p14:creationId xmlns:p14="http://schemas.microsoft.com/office/powerpoint/2010/main" val="860574064"/>
+        <p14:creationId xmlns:p14="http://schemas.microsoft.com/office/powerpoint/2010/main" xmlns="" val="860574064"/>
       </p:ext>
     </p:extLst>
   </p:cSld>
@@ -4716,7 +4740,7 @@
     </p:spTree>
     <p:extLst>
       <p:ext uri="{BB962C8B-B14F-4D97-AF65-F5344CB8AC3E}">
-        <p14:creationId xmlns:p14="http://schemas.microsoft.com/office/powerpoint/2010/main" val="157746128"/>
+        <p14:creationId xmlns:p14="http://schemas.microsoft.com/office/powerpoint/2010/main" xmlns="" val="157746128"/>
       </p:ext>
     </p:extLst>
   </p:cSld>
@@ -4818,7 +4842,7 @@
     </p:spTree>
     <p:extLst>
       <p:ext uri="{BB962C8B-B14F-4D97-AF65-F5344CB8AC3E}">
-        <p14:creationId xmlns:p14="http://schemas.microsoft.com/office/powerpoint/2010/main" val="1328119939"/>
+        <p14:creationId xmlns:p14="http://schemas.microsoft.com/office/powerpoint/2010/main" xmlns="" val="1328119939"/>
       </p:ext>
     </p:extLst>
   </p:cSld>
@@ -5289,7 +5313,7 @@
     </p:spTree>
     <p:extLst>
       <p:ext uri="{BB962C8B-B14F-4D97-AF65-F5344CB8AC3E}">
-        <p14:creationId xmlns:p14="http://schemas.microsoft.com/office/powerpoint/2010/main" val="2819007806"/>
+        <p14:creationId xmlns:p14="http://schemas.microsoft.com/office/powerpoint/2010/main" xmlns="" val="2819007806"/>
       </p:ext>
     </p:extLst>
   </p:cSld>
@@ -7272,7 +7296,7 @@
     </p:spTree>
     <p:extLst>
       <p:ext uri="{BB962C8B-B14F-4D97-AF65-F5344CB8AC3E}">
-        <p14:creationId xmlns:p14="http://schemas.microsoft.com/office/powerpoint/2010/main" val="2796438391"/>
+        <p14:creationId xmlns:p14="http://schemas.microsoft.com/office/powerpoint/2010/main" xmlns="" val="2796438391"/>
       </p:ext>
     </p:extLst>
   </p:cSld>
@@ -8635,7 +8659,7 @@
     </p:spTree>
     <p:extLst>
       <p:ext uri="{BB962C8B-B14F-4D97-AF65-F5344CB8AC3E}">
-        <p14:creationId xmlns:p14="http://schemas.microsoft.com/office/powerpoint/2010/main" val="2410065938"/>
+        <p14:creationId xmlns:p14="http://schemas.microsoft.com/office/powerpoint/2010/main" xmlns="" val="2410065938"/>
       </p:ext>
     </p:extLst>
   </p:cSld>
@@ -9203,8 +9227,8 @@
         </p:nvSpPr>
         <p:spPr>
           <a:xfrm>
-            <a:off x="6049083" y="1235248"/>
-            <a:ext cx="2972168" cy="5355311"/>
+            <a:off x="6049083" y="866844"/>
+            <a:ext cx="2972168" cy="5632311"/>
           </a:xfrm>
           <a:prstGeom prst="rect">
             <a:avLst/>
@@ -9236,6 +9260,20 @@
           </a:p>
           <a:p>
             <a:r>
+              <a:rPr lang="en-US" sz="1200" dirty="0" smtClean="0"/>
+              <a:t>	bucket (</a:t>
+            </a:r>
+            <a:r>
+              <a:rPr lang="en-US" sz="1200" dirty="0" err="1" smtClean="0"/>
+              <a:t>namespace.repo</a:t>
+            </a:r>
+            <a:r>
+              <a:rPr lang="en-US" sz="1200" dirty="0" smtClean="0"/>
+              <a:t>)</a:t>
+            </a:r>
+          </a:p>
+          <a:p>
+            <a:r>
               <a:rPr lang="en-US" dirty="0" smtClean="0"/>
               <a:t>	</a:t>
             </a:r>
@@ -9252,11 +9290,7 @@
           <a:p>
             <a:r>
               <a:rPr lang="en-US" sz="1200" dirty="0" smtClean="0"/>
-              <a:t>	record </a:t>
-            </a:r>
-            <a:r>
-              <a:rPr lang="en-US" sz="1200" dirty="0" smtClean="0"/>
-              <a:t>version</a:t>
+              <a:t>	record version</a:t>
             </a:r>
           </a:p>
           <a:p>
@@ -9270,11 +9304,7 @@
             </a:r>
             <a:r>
               <a:rPr lang="en-US" sz="1200" dirty="0" smtClean="0"/>
-              <a:t> create </a:t>
-            </a:r>
-            <a:r>
-              <a:rPr lang="en-US" sz="1200" dirty="0" smtClean="0"/>
-              <a:t>time</a:t>
+              <a:t> create time</a:t>
             </a:r>
           </a:p>
           <a:p>
@@ -9808,7 +9838,7 @@
     </p:spTree>
     <p:extLst>
       <p:ext uri="{BB962C8B-B14F-4D97-AF65-F5344CB8AC3E}">
-        <p14:creationId xmlns:p14="http://schemas.microsoft.com/office/powerpoint/2010/main" val="1200057453"/>
+        <p14:creationId xmlns:p14="http://schemas.microsoft.com/office/powerpoint/2010/main" xmlns="" val="1200057453"/>
       </p:ext>
     </p:extLst>
   </p:cSld>
@@ -11318,7 +11348,7 @@
     </p:spTree>
     <p:extLst>
       <p:ext uri="{BB962C8B-B14F-4D97-AF65-F5344CB8AC3E}">
-        <p14:creationId xmlns:p14="http://schemas.microsoft.com/office/powerpoint/2010/main" val="3224338808"/>
+        <p14:creationId xmlns:p14="http://schemas.microsoft.com/office/powerpoint/2010/main" xmlns="" val="3224338808"/>
       </p:ext>
     </p:extLst>
   </p:cSld>
@@ -12239,7 +12269,7 @@
     </p:spTree>
     <p:extLst>
       <p:ext uri="{BB962C8B-B14F-4D97-AF65-F5344CB8AC3E}">
-        <p14:creationId xmlns:p14="http://schemas.microsoft.com/office/powerpoint/2010/main" val="2433275009"/>
+        <p14:creationId xmlns:p14="http://schemas.microsoft.com/office/powerpoint/2010/main" xmlns="" val="2433275009"/>
       </p:ext>
     </p:extLst>
   </p:cSld>

</xml_diff>

<commit_message>
Changed slave to namespaceshard. Continuining to reorganize docx file...
</commit_message>
<xml_diff>
--- a/Documentation/MarFS.pptx
+++ b/Documentation/MarFS.pptx
@@ -309,7 +309,7 @@
           <a:p>
             <a:fld id="{E56B258B-56D6-9F4B-8030-AEA09AD708E7}" type="datetimeFigureOut">
               <a:rPr lang="en-US" smtClean="0"/>
-              <a:t>4/12/15</a:t>
+              <a:t>6/29/15</a:t>
             </a:fld>
             <a:endParaRPr lang="en-US"/>
           </a:p>
@@ -479,7 +479,7 @@
           <a:p>
             <a:fld id="{E56B258B-56D6-9F4B-8030-AEA09AD708E7}" type="datetimeFigureOut">
               <a:rPr lang="en-US" smtClean="0"/>
-              <a:t>4/12/15</a:t>
+              <a:t>6/29/15</a:t>
             </a:fld>
             <a:endParaRPr lang="en-US"/>
           </a:p>
@@ -659,7 +659,7 @@
           <a:p>
             <a:fld id="{E56B258B-56D6-9F4B-8030-AEA09AD708E7}" type="datetimeFigureOut">
               <a:rPr lang="en-US" smtClean="0"/>
-              <a:t>4/12/15</a:t>
+              <a:t>6/29/15</a:t>
             </a:fld>
             <a:endParaRPr lang="en-US"/>
           </a:p>
@@ -829,7 +829,7 @@
           <a:p>
             <a:fld id="{E56B258B-56D6-9F4B-8030-AEA09AD708E7}" type="datetimeFigureOut">
               <a:rPr lang="en-US" smtClean="0"/>
-              <a:t>4/12/15</a:t>
+              <a:t>6/29/15</a:t>
             </a:fld>
             <a:endParaRPr lang="en-US"/>
           </a:p>
@@ -1075,7 +1075,7 @@
           <a:p>
             <a:fld id="{E56B258B-56D6-9F4B-8030-AEA09AD708E7}" type="datetimeFigureOut">
               <a:rPr lang="en-US" smtClean="0"/>
-              <a:t>4/12/15</a:t>
+              <a:t>6/29/15</a:t>
             </a:fld>
             <a:endParaRPr lang="en-US"/>
           </a:p>
@@ -1363,7 +1363,7 @@
           <a:p>
             <a:fld id="{E56B258B-56D6-9F4B-8030-AEA09AD708E7}" type="datetimeFigureOut">
               <a:rPr lang="en-US" smtClean="0"/>
-              <a:t>4/12/15</a:t>
+              <a:t>6/29/15</a:t>
             </a:fld>
             <a:endParaRPr lang="en-US"/>
           </a:p>
@@ -1785,7 +1785,7 @@
           <a:p>
             <a:fld id="{E56B258B-56D6-9F4B-8030-AEA09AD708E7}" type="datetimeFigureOut">
               <a:rPr lang="en-US" smtClean="0"/>
-              <a:t>4/12/15</a:t>
+              <a:t>6/29/15</a:t>
             </a:fld>
             <a:endParaRPr lang="en-US"/>
           </a:p>
@@ -1903,7 +1903,7 @@
           <a:p>
             <a:fld id="{E56B258B-56D6-9F4B-8030-AEA09AD708E7}" type="datetimeFigureOut">
               <a:rPr lang="en-US" smtClean="0"/>
-              <a:t>4/12/15</a:t>
+              <a:t>6/29/15</a:t>
             </a:fld>
             <a:endParaRPr lang="en-US"/>
           </a:p>
@@ -1998,7 +1998,7 @@
           <a:p>
             <a:fld id="{E56B258B-56D6-9F4B-8030-AEA09AD708E7}" type="datetimeFigureOut">
               <a:rPr lang="en-US" smtClean="0"/>
-              <a:t>4/12/15</a:t>
+              <a:t>6/29/15</a:t>
             </a:fld>
             <a:endParaRPr lang="en-US"/>
           </a:p>
@@ -2275,7 +2275,7 @@
           <a:p>
             <a:fld id="{E56B258B-56D6-9F4B-8030-AEA09AD708E7}" type="datetimeFigureOut">
               <a:rPr lang="en-US" smtClean="0"/>
-              <a:t>4/12/15</a:t>
+              <a:t>6/29/15</a:t>
             </a:fld>
             <a:endParaRPr lang="en-US"/>
           </a:p>
@@ -2528,7 +2528,7 @@
           <a:p>
             <a:fld id="{E56B258B-56D6-9F4B-8030-AEA09AD708E7}" type="datetimeFigureOut">
               <a:rPr lang="en-US" smtClean="0"/>
-              <a:t>4/12/15</a:t>
+              <a:t>6/29/15</a:t>
             </a:fld>
             <a:endParaRPr lang="en-US"/>
           </a:p>
@@ -2741,7 +2741,7 @@
           <a:p>
             <a:fld id="{E56B258B-56D6-9F4B-8030-AEA09AD708E7}" type="datetimeFigureOut">
               <a:rPr lang="en-US" smtClean="0"/>
-              <a:t>4/12/15</a:t>
+              <a:t>6/29/15</a:t>
             </a:fld>
             <a:endParaRPr lang="en-US"/>
           </a:p>
@@ -6689,13 +6689,17 @@
         </p:spPr>
         <p:txBody>
           <a:bodyPr>
-            <a:normAutofit fontScale="92500" lnSpcReduction="10000"/>
+            <a:normAutofit fontScale="92500" lnSpcReduction="20000"/>
           </a:bodyPr>
           <a:lstStyle/>
           <a:p>
             <a:r>
               <a:rPr lang="en-US" sz="1800" dirty="0" smtClean="0"/>
-              <a:t>Slave Directory Structure using Namespace A Directory </a:t>
+              <a:t>Namespace Shard Directory </a:t>
+            </a:r>
+            <a:r>
+              <a:rPr lang="en-US" sz="1800" dirty="0" smtClean="0"/>
+              <a:t>Structure using Namespace A Directory </a:t>
             </a:r>
             <a:r>
               <a:rPr lang="en-US" sz="1800" dirty="0" err="1" smtClean="0"/>
@@ -6714,8 +6718,13 @@
             </a:r>
             <a:r>
               <a:rPr lang="en-US" sz="1800" dirty="0" smtClean="0"/>
-              <a:t>) across slaves</a:t>
-            </a:r>
+              <a:t>) across </a:t>
+            </a:r>
+            <a:r>
+              <a:rPr lang="en-US" sz="1800" dirty="0" smtClean="0"/>
+              <a:t>namespace shards</a:t>
+            </a:r>
+            <a:endParaRPr lang="en-US" sz="1800" dirty="0" smtClean="0"/>
           </a:p>
           <a:p>
             <a:r>
@@ -6728,17 +6737,16 @@
             </a:r>
             <a:r>
               <a:rPr lang="en-US" sz="1800" dirty="0" smtClean="0"/>
-              <a:t>and MD ops against directories are now </a:t>
+              <a:t>and MD ops against directories are now threaded (including rename of files much </a:t>
+            </a:r>
+            <a:r>
+              <a:rPr lang="en-US" sz="1800" dirty="0" err="1" smtClean="0"/>
+              <a:t>chang</a:t>
             </a:r>
             <a:r>
               <a:rPr lang="en-US" sz="1800" dirty="0" smtClean="0"/>
-              <a:t>threaded (including rename of files much </a:t>
-            </a:r>
-            <a:r>
-              <a:rPr lang="en-US" sz="1800" smtClean="0"/>
-              <a:t>chang)</a:t>
-            </a:r>
-            <a:endParaRPr lang="en-US" sz="1800" dirty="0" smtClean="0"/>
+              <a:t>)</a:t>
+            </a:r>
           </a:p>
           <a:p>
             <a:r>
@@ -6787,8 +6795,8 @@
         </p:nvSpPr>
         <p:spPr>
           <a:xfrm>
-            <a:off x="3295650" y="1668502"/>
-            <a:ext cx="2730500" cy="1477328"/>
+            <a:off x="2627556" y="1660436"/>
+            <a:ext cx="3558687" cy="1477328"/>
           </a:xfrm>
           <a:prstGeom prst="rect">
             <a:avLst/>
@@ -6812,7 +6820,11 @@
             </a:r>
             <a:r>
               <a:rPr lang="en-US" dirty="0" err="1" smtClean="0"/>
-              <a:t>slavep</a:t>
+              <a:t>namespaceshard</a:t>
+            </a:r>
+            <a:r>
+              <a:rPr lang="en-US" dirty="0" err="1" smtClean="0"/>
+              <a:t>p</a:t>
             </a:r>
             <a:r>
               <a:rPr lang="en-US" dirty="0" smtClean="0"/>
@@ -6863,8 +6875,8 @@
         </p:nvSpPr>
         <p:spPr>
           <a:xfrm>
-            <a:off x="6172200" y="1660436"/>
-            <a:ext cx="2743200" cy="1477328"/>
+            <a:off x="5976938" y="1660436"/>
+            <a:ext cx="3167062" cy="1477328"/>
           </a:xfrm>
           <a:prstGeom prst="rect">
             <a:avLst/>
@@ -6888,12 +6900,17 @@
             </a:r>
             <a:r>
               <a:rPr lang="en-US" dirty="0" err="1" smtClean="0"/>
-              <a:t>slavepnum</a:t>
+              <a:t>namespaceshard</a:t>
+            </a:r>
+            <a:r>
+              <a:rPr lang="en-US" dirty="0" err="1" smtClean="0"/>
+              <a:t>pnum</a:t>
             </a:r>
             <a:r>
               <a:rPr lang="en-US" dirty="0" smtClean="0"/>
               <a:t> </a:t>
             </a:r>
+            <a:endParaRPr lang="en-US" dirty="0" smtClean="0"/>
           </a:p>
           <a:p>
             <a:pPr algn="ctr"/>
@@ -6903,8 +6920,13 @@
             </a:r>
             <a:r>
               <a:rPr lang="en-US" dirty="0" smtClean="0"/>
-              <a:t>=4 (4 slaves)</a:t>
-            </a:r>
+              <a:t>=4 (4 </a:t>
+            </a:r>
+            <a:r>
+              <a:rPr lang="en-US" dirty="0" smtClean="0"/>
+              <a:t>NS-shards)</a:t>
+            </a:r>
+            <a:endParaRPr lang="en-US" dirty="0" smtClean="0"/>
           </a:p>
           <a:p>
             <a:pPr algn="ctr"/>
@@ -6942,8 +6964,8 @@
         </p:nvSpPr>
         <p:spPr>
           <a:xfrm>
-            <a:off x="4673599" y="1032638"/>
-            <a:ext cx="2835276" cy="369332"/>
+            <a:off x="4025900" y="1032638"/>
+            <a:ext cx="4033715" cy="369332"/>
           </a:xfrm>
           <a:prstGeom prst="rect">
             <a:avLst/>
@@ -6966,7 +6988,7 @@
             </a:r>
             <a:r>
               <a:rPr lang="en-US" dirty="0" err="1" smtClean="0"/>
-              <a:t>slavepnum</a:t>
+              <a:t>namespaceshardpnum</a:t>
             </a:r>
             <a:r>
               <a:rPr lang="en-US" dirty="0" smtClean="0"/>
@@ -7048,7 +7070,7 @@
         </p:nvCxnSpPr>
         <p:spPr>
           <a:xfrm flipH="1">
-            <a:off x="4025900" y="2697370"/>
+            <a:off x="3792415" y="2697370"/>
             <a:ext cx="381000" cy="448460"/>
           </a:xfrm>
           <a:prstGeom prst="line">
@@ -7078,7 +7100,7 @@
         </p:nvSpPr>
         <p:spPr>
           <a:xfrm>
-            <a:off x="3736975" y="3187868"/>
+            <a:off x="3448050" y="3187868"/>
             <a:ext cx="577850" cy="369332"/>
           </a:xfrm>
           <a:prstGeom prst="rect">
@@ -7130,7 +7152,7 @@
             <a:pPr algn="ctr"/>
             <a:r>
               <a:rPr lang="en-US" dirty="0" smtClean="0"/>
-              <a:t>Slave 1</a:t>
+              <a:t>NS-shard1</a:t>
             </a:r>
             <a:endParaRPr lang="en-US" dirty="0"/>
           </a:p>
@@ -7294,8 +7316,8 @@
         </p:nvSpPr>
         <p:spPr>
           <a:xfrm>
-            <a:off x="4127500" y="3589804"/>
-            <a:ext cx="4381500" cy="646331"/>
+            <a:off x="3556000" y="3589804"/>
+            <a:ext cx="5587999" cy="646331"/>
           </a:xfrm>
           <a:prstGeom prst="rect">
             <a:avLst/>
@@ -7311,7 +7333,15 @@
             <a:pPr algn="ctr"/>
             <a:r>
               <a:rPr lang="en-US" dirty="0" smtClean="0"/>
-              <a:t>GPFS File Systems as slaves to Namespace A</a:t>
+              <a:t>GPFS File Systems as </a:t>
+            </a:r>
+            <a:r>
+              <a:rPr lang="en-US" dirty="0" smtClean="0"/>
+              <a:t>Namespace Shards to </a:t>
+            </a:r>
+            <a:r>
+              <a:rPr lang="en-US" dirty="0" smtClean="0"/>
+              <a:t>Namespace A</a:t>
             </a:r>
           </a:p>
           <a:p>
@@ -7354,7 +7384,7 @@
             <a:pPr algn="ctr"/>
             <a:r>
               <a:rPr lang="en-US" dirty="0" smtClean="0"/>
-              <a:t>Slave 2</a:t>
+              <a:t>NS-shard2</a:t>
             </a:r>
             <a:endParaRPr lang="en-US" dirty="0"/>
           </a:p>
@@ -7390,7 +7420,7 @@
             <a:pPr algn="ctr"/>
             <a:r>
               <a:rPr lang="en-US" dirty="0" smtClean="0"/>
-              <a:t>Slave 3</a:t>
+              <a:t>NS-shard3</a:t>
             </a:r>
             <a:endParaRPr lang="en-US" dirty="0"/>
           </a:p>
@@ -7426,7 +7456,7 @@
             <a:pPr algn="ctr"/>
             <a:r>
               <a:rPr lang="en-US" dirty="0" smtClean="0"/>
-              <a:t>Slave 4</a:t>
+              <a:t>NS-shard4</a:t>
             </a:r>
             <a:endParaRPr lang="en-US" dirty="0"/>
           </a:p>
@@ -13612,7 +13642,7 @@
         <p:spPr>
           <a:xfrm>
             <a:off x="198480" y="570028"/>
-            <a:ext cx="1898522" cy="6032422"/>
+            <a:ext cx="2087520" cy="6032422"/>
           </a:xfrm>
           <a:prstGeom prst="rect">
             <a:avLst/>
@@ -13795,23 +13825,15 @@
           </a:p>
           <a:p>
             <a:r>
-              <a:rPr lang="en-US" sz="1600" dirty="0" err="1"/>
-              <a:t>s</a:t>
-            </a:r>
-            <a:r>
               <a:rPr lang="en-US" sz="1600" dirty="0" err="1" smtClean="0"/>
-              <a:t>lavep</a:t>
+              <a:t>namespaceshardp</a:t>
             </a:r>
             <a:endParaRPr lang="en-US" sz="1600" dirty="0"/>
           </a:p>
           <a:p>
             <a:r>
               <a:rPr lang="en-US" sz="1600" dirty="0" err="1" smtClean="0"/>
-              <a:t>slavepnum</a:t>
-            </a:r>
-            <a:r>
-              <a:rPr lang="en-US" sz="1600" dirty="0" smtClean="0"/>
-              <a:t> </a:t>
+              <a:t>namespaceshardpnum</a:t>
             </a:r>
             <a:endParaRPr lang="en-US" sz="1600" dirty="0"/>
           </a:p>
@@ -14299,7 +14321,7 @@
             </a:r>
             <a:r>
               <a:rPr lang="en-US" sz="1200" dirty="0" err="1" smtClean="0"/>
-              <a:t>slavepnum</a:t>
+              <a:t>namespaceshardpnum</a:t>
             </a:r>
             <a:endParaRPr lang="en-US" sz="1200" dirty="0" smtClean="0"/>
           </a:p>

</xml_diff>